<commit_message>
cambio mapa 06-03 y rev 10-02
</commit_message>
<xml_diff>
--- a/fuentes/contenidos/grado06/guion03/CN_06_03.pptx
+++ b/fuentes/contenidos/grado06/guion03/CN_06_03.pptx
@@ -106,7 +106,18 @@
   </p:defaultTextStyle>
   <p:extLst>
     <p:ext uri="{EFAFB233-063F-42B5-8137-9DF3F51BA10A}">
-      <p15:sldGuideLst xmlns="" xmlns:p15="http://schemas.microsoft.com/office/powerpoint/2012/main"/>
+      <p15:sldGuideLst xmlns:p15="http://schemas.microsoft.com/office/powerpoint/2012/main">
+        <p15:guide id="1" orient="horz" pos="2160">
+          <p15:clr>
+            <a:srgbClr val="A4A3A4"/>
+          </p15:clr>
+        </p15:guide>
+        <p15:guide id="2" pos="2880">
+          <p15:clr>
+            <a:srgbClr val="A4A3A4"/>
+          </p15:clr>
+        </p15:guide>
+      </p15:sldGuideLst>
     </p:ext>
   </p:extLst>
 </p:presentation>
@@ -142,7 +153,7 @@
   <p:timing>
     <p:tnLst>
       <p:par>
-        <p:cTn xmlns:p14="http://schemas.microsoft.com/office/powerpoint/2010/main" id="1" dur="indefinite" restart="never" nodeType="tmRoot"/>
+        <p:cTn id="1" dur="indefinite" restart="never" nodeType="tmRoot"/>
       </p:par>
     </p:tnLst>
   </p:timing>
@@ -179,7 +190,7 @@
   <p:timing>
     <p:tnLst>
       <p:par>
-        <p:cTn xmlns:p14="http://schemas.microsoft.com/office/powerpoint/2010/main" id="1" dur="indefinite" restart="never" nodeType="tmRoot"/>
+        <p:cTn id="1" dur="indefinite" restart="never" nodeType="tmRoot"/>
       </p:par>
     </p:tnLst>
   </p:timing>
@@ -216,7 +227,7 @@
   <p:timing>
     <p:tnLst>
       <p:par>
-        <p:cTn xmlns:p14="http://schemas.microsoft.com/office/powerpoint/2010/main" id="1" dur="indefinite" restart="never" nodeType="tmRoot"/>
+        <p:cTn id="1" dur="indefinite" restart="never" nodeType="tmRoot"/>
       </p:par>
     </p:tnLst>
   </p:timing>
@@ -253,7 +264,7 @@
   <p:timing>
     <p:tnLst>
       <p:par>
-        <p:cTn xmlns:p14="http://schemas.microsoft.com/office/powerpoint/2010/main" id="1" dur="indefinite" restart="never" nodeType="tmRoot"/>
+        <p:cTn id="1" dur="indefinite" restart="never" nodeType="tmRoot"/>
       </p:par>
     </p:tnLst>
   </p:timing>
@@ -290,7 +301,7 @@
   <p:timing>
     <p:tnLst>
       <p:par>
-        <p:cTn xmlns:p14="http://schemas.microsoft.com/office/powerpoint/2010/main" id="1" dur="indefinite" restart="never" nodeType="tmRoot"/>
+        <p:cTn id="1" dur="indefinite" restart="never" nodeType="tmRoot"/>
       </p:par>
     </p:tnLst>
   </p:timing>
@@ -327,7 +338,7 @@
   <p:timing>
     <p:tnLst>
       <p:par>
-        <p:cTn xmlns:p14="http://schemas.microsoft.com/office/powerpoint/2010/main" id="1" dur="indefinite" restart="never" nodeType="tmRoot"/>
+        <p:cTn id="1" dur="indefinite" restart="never" nodeType="tmRoot"/>
       </p:par>
     </p:tnLst>
   </p:timing>
@@ -364,7 +375,7 @@
   <p:timing>
     <p:tnLst>
       <p:par>
-        <p:cTn xmlns:p14="http://schemas.microsoft.com/office/powerpoint/2010/main" id="1" dur="indefinite" restart="never" nodeType="tmRoot"/>
+        <p:cTn id="1" dur="indefinite" restart="never" nodeType="tmRoot"/>
       </p:par>
     </p:tnLst>
   </p:timing>
@@ -401,7 +412,7 @@
   <p:timing>
     <p:tnLst>
       <p:par>
-        <p:cTn xmlns:p14="http://schemas.microsoft.com/office/powerpoint/2010/main" id="1" dur="indefinite" restart="never" nodeType="tmRoot"/>
+        <p:cTn id="1" dur="indefinite" restart="never" nodeType="tmRoot"/>
       </p:par>
     </p:tnLst>
   </p:timing>
@@ -450,7 +461,7 @@
           <a:p>
             <a:fld id="{5001C876-01F7-4317-94B9-1AE222133113}" type="datetimeFigureOut">
               <a:rPr lang="es-ES" smtClean="0"/>
-              <a:t>21/09/15</a:t>
+              <a:t>23/09/2015</a:t>
             </a:fld>
             <a:endParaRPr lang="es-ES"/>
           </a:p>
@@ -508,7 +519,7 @@
           <a:p>
             <a:fld id="{58140F73-F5A2-4B82-A2FA-BF1850CF1309}" type="slidenum">
               <a:rPr lang="es-ES" smtClean="0"/>
-              <a:t>‹#›</a:t>
+              <a:t>‹Nº›</a:t>
             </a:fld>
             <a:endParaRPr lang="es-ES"/>
           </a:p>
@@ -527,7 +538,7 @@
   <p:timing>
     <p:tnLst>
       <p:par>
-        <p:cTn xmlns:p14="http://schemas.microsoft.com/office/powerpoint/2010/main" id="1" dur="indefinite" restart="never" nodeType="tmRoot"/>
+        <p:cTn id="1" dur="indefinite" restart="never" nodeType="tmRoot"/>
       </p:par>
     </p:tnLst>
   </p:timing>
@@ -564,7 +575,7 @@
   <p:timing>
     <p:tnLst>
       <p:par>
-        <p:cTn xmlns:p14="http://schemas.microsoft.com/office/powerpoint/2010/main" id="1" dur="indefinite" restart="never" nodeType="tmRoot"/>
+        <p:cTn id="1" dur="indefinite" restart="never" nodeType="tmRoot"/>
       </p:par>
     </p:tnLst>
   </p:timing>
@@ -601,7 +612,7 @@
   <p:timing>
     <p:tnLst>
       <p:par>
-        <p:cTn xmlns:p14="http://schemas.microsoft.com/office/powerpoint/2010/main" id="1" dur="indefinite" restart="never" nodeType="tmRoot"/>
+        <p:cTn id="1" dur="indefinite" restart="never" nodeType="tmRoot"/>
       </p:par>
     </p:tnLst>
   </p:timing>
@@ -714,7 +725,7 @@
   <p:timing>
     <p:tnLst>
       <p:par>
-        <p:cTn xmlns:p14="http://schemas.microsoft.com/office/powerpoint/2010/main" id="1" dur="indefinite" restart="never" nodeType="tmRoot"/>
+        <p:cTn id="1" dur="indefinite" restart="never" nodeType="tmRoot"/>
       </p:par>
     </p:tnLst>
   </p:timing>
@@ -1048,7 +1059,7 @@
           <a:effectLst/>
           <a:extLst>
             <a:ext uri="{AF507438-7753-43e0-B8FC-AC1667EBCBE1}">
-              <a14:hiddenEffects xmlns:a14="http://schemas.microsoft.com/office/drawing/2010/main">
+              <a14:hiddenEffects xmlns:a14="http://schemas.microsoft.com/office/drawing/2010/main" xmlns="">
                 <a:effectLst>
                   <a:outerShdw blurRad="63500" dist="38099" dir="2700000" algn="ctr" rotWithShape="0">
                     <a:srgbClr val="000000">
@@ -1474,7 +1485,7 @@
           <a:effectLst/>
           <a:extLst>
             <a:ext uri="{91240B29-F687-4f45-9708-019B960494DF}">
-              <a14:hiddenLine xmlns:a14="http://schemas.microsoft.com/office/drawing/2010/main" w="9525">
+              <a14:hiddenLine xmlns:a14="http://schemas.microsoft.com/office/drawing/2010/main" xmlns="" w="9525">
                 <a:solidFill>
                   <a:srgbClr val="000000"/>
                 </a:solidFill>
@@ -1484,7 +1495,7 @@
               </a14:hiddenLine>
             </a:ext>
             <a:ext uri="{AF507438-7753-43e0-B8FC-AC1667EBCBE1}">
-              <a14:hiddenEffects xmlns:a14="http://schemas.microsoft.com/office/drawing/2010/main">
+              <a14:hiddenEffects xmlns:a14="http://schemas.microsoft.com/office/drawing/2010/main" xmlns="">
                 <a:effectLst>
                   <a:outerShdw blurRad="63500" dist="38099" dir="2700000" algn="ctr" rotWithShape="0">
                     <a:srgbClr val="000000">
@@ -1799,7 +1810,7 @@
           <a:effectLst/>
           <a:extLst>
             <a:ext uri="{91240B29-F687-4f45-9708-019B960494DF}">
-              <a14:hiddenLine xmlns:a14="http://schemas.microsoft.com/office/drawing/2010/main" w="9525">
+              <a14:hiddenLine xmlns:a14="http://schemas.microsoft.com/office/drawing/2010/main" xmlns="" w="9525">
                 <a:solidFill>
                   <a:srgbClr val="000000"/>
                 </a:solidFill>
@@ -1809,7 +1820,7 @@
               </a14:hiddenLine>
             </a:ext>
             <a:ext uri="{AF507438-7753-43e0-B8FC-AC1667EBCBE1}">
-              <a14:hiddenEffects xmlns:a14="http://schemas.microsoft.com/office/drawing/2010/main">
+              <a14:hiddenEffects xmlns:a14="http://schemas.microsoft.com/office/drawing/2010/main" xmlns="">
                 <a:effectLst>
                   <a:outerShdw blurRad="63500" dist="38099" dir="2700000" algn="ctr" rotWithShape="0">
                     <a:srgbClr val="000000">
@@ -2124,7 +2135,7 @@
           <a:effectLst/>
           <a:extLst>
             <a:ext uri="{91240B29-F687-4f45-9708-019B960494DF}">
-              <a14:hiddenLine xmlns:a14="http://schemas.microsoft.com/office/drawing/2010/main" w="9525">
+              <a14:hiddenLine xmlns:a14="http://schemas.microsoft.com/office/drawing/2010/main" xmlns="" w="9525">
                 <a:solidFill>
                   <a:srgbClr val="000000"/>
                 </a:solidFill>
@@ -2134,7 +2145,7 @@
               </a14:hiddenLine>
             </a:ext>
             <a:ext uri="{AF507438-7753-43e0-B8FC-AC1667EBCBE1}">
-              <a14:hiddenEffects xmlns:a14="http://schemas.microsoft.com/office/drawing/2010/main">
+              <a14:hiddenEffects xmlns:a14="http://schemas.microsoft.com/office/drawing/2010/main" xmlns="">
                 <a:effectLst>
                   <a:outerShdw blurRad="63500" dist="38099" dir="2700000" algn="ctr" rotWithShape="0">
                     <a:srgbClr val="000000">
@@ -3249,7 +3260,7 @@
           <a:effectLst/>
           <a:extLst>
             <a:ext uri="{91240B29-F687-4f45-9708-019B960494DF}">
-              <a14:hiddenLine xmlns:a14="http://schemas.microsoft.com/office/drawing/2010/main" w="9525">
+              <a14:hiddenLine xmlns:a14="http://schemas.microsoft.com/office/drawing/2010/main" xmlns="" w="9525">
                 <a:solidFill>
                   <a:srgbClr val="000000"/>
                 </a:solidFill>
@@ -3259,7 +3270,7 @@
               </a14:hiddenLine>
             </a:ext>
             <a:ext uri="{AF507438-7753-43e0-B8FC-AC1667EBCBE1}">
-              <a14:hiddenEffects xmlns:a14="http://schemas.microsoft.com/office/drawing/2010/main">
+              <a14:hiddenEffects xmlns:a14="http://schemas.microsoft.com/office/drawing/2010/main" xmlns="">
                 <a:effectLst>
                   <a:outerShdw blurRad="63500" dist="38099" dir="2700000" algn="ctr" rotWithShape="0">
                     <a:srgbClr val="000000">
@@ -3579,7 +3590,7 @@
           <a:effectLst/>
           <a:extLst>
             <a:ext uri="{AF507438-7753-43e0-B8FC-AC1667EBCBE1}">
-              <a14:hiddenEffects xmlns:a14="http://schemas.microsoft.com/office/drawing/2010/main">
+              <a14:hiddenEffects xmlns:a14="http://schemas.microsoft.com/office/drawing/2010/main" xmlns="">
                 <a:effectLst>
                   <a:outerShdw blurRad="63500" dist="38099" dir="2700000" algn="ctr" rotWithShape="0">
                     <a:srgbClr val="000000">
@@ -3862,12 +3873,20 @@
               <a:buNone/>
             </a:pPr>
             <a:r>
+              <a:rPr lang="es-ES" sz="900" dirty="0">
+                <a:solidFill>
+                  <a:srgbClr val="FFFFFF"/>
+                </a:solidFill>
+              </a:rPr>
+              <a:t>c</a:t>
+            </a:r>
+            <a:r>
               <a:rPr lang="es-ES" sz="900" dirty="0" smtClean="0">
                 <a:solidFill>
                   <a:srgbClr val="FFFFFF"/>
                 </a:solidFill>
               </a:rPr>
-              <a:t>Células</a:t>
+              <a:t>élulas</a:t>
             </a:r>
             <a:endParaRPr lang="es-ES" sz="900" dirty="0">
               <a:solidFill>
@@ -3907,7 +3926,7 @@
           <a:effectLst/>
           <a:extLst>
             <a:ext uri="{AF507438-7753-43e0-B8FC-AC1667EBCBE1}">
-              <a14:hiddenEffects xmlns:a14="http://schemas.microsoft.com/office/drawing/2010/main">
+              <a14:hiddenEffects xmlns:a14="http://schemas.microsoft.com/office/drawing/2010/main" xmlns="">
                 <a:effectLst>
                   <a:outerShdw blurRad="63500" dist="38099" dir="2700000" algn="ctr" rotWithShape="0">
                     <a:srgbClr val="000000">
@@ -4190,12 +4209,20 @@
               <a:buNone/>
             </a:pPr>
             <a:r>
+              <a:rPr lang="es-ES" sz="900" dirty="0">
+                <a:solidFill>
+                  <a:srgbClr val="FFFFFF"/>
+                </a:solidFill>
+              </a:rPr>
+              <a:t>b</a:t>
+            </a:r>
+            <a:r>
               <a:rPr lang="es-ES" sz="900" dirty="0" smtClean="0">
                 <a:solidFill>
                   <a:srgbClr val="FFFFFF"/>
                 </a:solidFill>
               </a:rPr>
-              <a:t>Bioelementos</a:t>
+              <a:t>ioelementos</a:t>
             </a:r>
             <a:endParaRPr lang="es-ES" sz="900" dirty="0">
               <a:solidFill>
@@ -4235,7 +4262,7 @@
           <a:effectLst/>
           <a:extLst>
             <a:ext uri="{AF507438-7753-43e0-B8FC-AC1667EBCBE1}">
-              <a14:hiddenEffects xmlns:a14="http://schemas.microsoft.com/office/drawing/2010/main">
+              <a14:hiddenEffects xmlns:a14="http://schemas.microsoft.com/office/drawing/2010/main" xmlns="">
                 <a:effectLst>
                   <a:outerShdw blurRad="63500" dist="38099" dir="2700000" algn="ctr" rotWithShape="0">
                     <a:srgbClr val="000000">
@@ -4518,12 +4545,20 @@
               <a:buNone/>
             </a:pPr>
             <a:r>
+              <a:rPr lang="es-ES" sz="900" dirty="0">
+                <a:solidFill>
+                  <a:srgbClr val="FFFFFF"/>
+                </a:solidFill>
+              </a:rPr>
+              <a:t>r</a:t>
+            </a:r>
+            <a:r>
               <a:rPr lang="es-ES" sz="900" dirty="0" smtClean="0">
                 <a:solidFill>
                   <a:srgbClr val="FFFFFF"/>
                 </a:solidFill>
               </a:rPr>
-              <a:t>Relación</a:t>
+              <a:t>elación</a:t>
             </a:r>
             <a:endParaRPr lang="es-ES" sz="900" dirty="0">
               <a:solidFill>
@@ -4563,7 +4598,7 @@
           <a:effectLst/>
           <a:extLst>
             <a:ext uri="{AF507438-7753-43e0-B8FC-AC1667EBCBE1}">
-              <a14:hiddenEffects xmlns:a14="http://schemas.microsoft.com/office/drawing/2010/main">
+              <a14:hiddenEffects xmlns:a14="http://schemas.microsoft.com/office/drawing/2010/main" xmlns="">
                 <a:effectLst>
                   <a:outerShdw blurRad="63500" dist="38099" dir="2700000" algn="ctr" rotWithShape="0">
                     <a:srgbClr val="000000">
@@ -4846,12 +4881,20 @@
               <a:buNone/>
             </a:pPr>
             <a:r>
+              <a:rPr lang="es-ES" sz="900" dirty="0">
+                <a:solidFill>
+                  <a:srgbClr val="FFFFFF"/>
+                </a:solidFill>
+              </a:rPr>
+              <a:t>r</a:t>
+            </a:r>
+            <a:r>
               <a:rPr lang="es-ES" sz="900" dirty="0" smtClean="0">
                 <a:solidFill>
                   <a:srgbClr val="FFFFFF"/>
                 </a:solidFill>
               </a:rPr>
-              <a:t>Reproducción</a:t>
+              <a:t>eproducción</a:t>
             </a:r>
             <a:endParaRPr lang="es-ES" sz="900" dirty="0">
               <a:solidFill>
@@ -4891,7 +4934,7 @@
           <a:effectLst/>
           <a:extLst>
             <a:ext uri="{AF507438-7753-43e0-B8FC-AC1667EBCBE1}">
-              <a14:hiddenEffects xmlns:a14="http://schemas.microsoft.com/office/drawing/2010/main">
+              <a14:hiddenEffects xmlns:a14="http://schemas.microsoft.com/office/drawing/2010/main" xmlns="">
                 <a:effectLst>
                   <a:outerShdw blurRad="63500" dist="38099" dir="2700000" algn="ctr" rotWithShape="0">
                     <a:srgbClr val="000000">
@@ -5174,12 +5217,20 @@
               <a:buNone/>
             </a:pPr>
             <a:r>
+              <a:rPr lang="es-ES" sz="900" dirty="0">
+                <a:solidFill>
+                  <a:srgbClr val="FFFFFF"/>
+                </a:solidFill>
+              </a:rPr>
+              <a:t>n</a:t>
+            </a:r>
+            <a:r>
               <a:rPr lang="es-ES" sz="900" dirty="0" smtClean="0">
                 <a:solidFill>
                   <a:srgbClr val="FFFFFF"/>
                 </a:solidFill>
               </a:rPr>
-              <a:t>Nutrición</a:t>
+              <a:t>utrición</a:t>
             </a:r>
             <a:endParaRPr lang="es-ES" sz="900" dirty="0">
               <a:solidFill>
@@ -5214,7 +5265,7 @@
           <a:effectLst/>
           <a:extLst>
             <a:ext uri="{91240B29-F687-4f45-9708-019B960494DF}">
-              <a14:hiddenLine xmlns:a14="http://schemas.microsoft.com/office/drawing/2010/main" w="9525">
+              <a14:hiddenLine xmlns:a14="http://schemas.microsoft.com/office/drawing/2010/main" xmlns="" w="9525">
                 <a:solidFill>
                   <a:srgbClr val="000000"/>
                 </a:solidFill>
@@ -5224,7 +5275,7 @@
               </a14:hiddenLine>
             </a:ext>
             <a:ext uri="{AF507438-7753-43e0-B8FC-AC1667EBCBE1}">
-              <a14:hiddenEffects xmlns:a14="http://schemas.microsoft.com/office/drawing/2010/main">
+              <a14:hiddenEffects xmlns:a14="http://schemas.microsoft.com/office/drawing/2010/main" xmlns="">
                 <a:effectLst>
                   <a:outerShdw blurRad="63500" dist="38099" dir="2700000" algn="ctr" rotWithShape="0">
                     <a:srgbClr val="000000">
@@ -5544,7 +5595,7 @@
           <a:effectLst/>
           <a:extLst>
             <a:ext uri="{AF507438-7753-43e0-B8FC-AC1667EBCBE1}">
-              <a14:hiddenEffects xmlns:a14="http://schemas.microsoft.com/office/drawing/2010/main">
+              <a14:hiddenEffects xmlns:a14="http://schemas.microsoft.com/office/drawing/2010/main" xmlns="">
                 <a:effectLst>
                   <a:outerShdw blurRad="63500" dist="38099" dir="2700000" algn="ctr" rotWithShape="0">
                     <a:srgbClr val="000000">
@@ -5827,9 +5878,14 @@
               <a:buChar char="•"/>
             </a:pPr>
             <a:r>
-              <a:rPr lang="es-ES" sz="900" dirty="0" smtClean="0"/>
-              <a:t>Procariota</a:t>
+              <a:rPr lang="en-US" sz="900" dirty="0"/>
+              <a:t>p</a:t>
             </a:r>
+            <a:r>
+              <a:rPr lang="es-ES" sz="900" dirty="0" err="1" smtClean="0"/>
+              <a:t>rocariota</a:t>
+            </a:r>
+            <a:endParaRPr lang="es-ES" sz="900" dirty="0" smtClean="0"/>
           </a:p>
           <a:p>
             <a:pPr marL="171450" indent="-171450">
@@ -5838,8 +5894,12 @@
               <a:buChar char="•"/>
             </a:pPr>
             <a:r>
+              <a:rPr lang="es-ES" sz="900" dirty="0"/>
+              <a:t>e</a:t>
+            </a:r>
+            <a:r>
               <a:rPr lang="es-ES" sz="900" dirty="0" smtClean="0"/>
-              <a:t>Eucariota</a:t>
+              <a:t>ucariota</a:t>
             </a:r>
             <a:endParaRPr lang="es-ES" sz="900" dirty="0"/>
           </a:p>
@@ -5875,7 +5935,7 @@
           <a:effectLst/>
           <a:extLst>
             <a:ext uri="{AF507438-7753-43e0-B8FC-AC1667EBCBE1}">
-              <a14:hiddenEffects xmlns:a14="http://schemas.microsoft.com/office/drawing/2010/main">
+              <a14:hiddenEffects xmlns:a14="http://schemas.microsoft.com/office/drawing/2010/main" xmlns="">
                 <a:effectLst>
                   <a:outerShdw blurRad="63500" dist="38099" dir="2700000" algn="ctr" rotWithShape="0">
                     <a:srgbClr val="000000">
@@ -6158,10 +6218,8 @@
               <a:buChar char="•"/>
             </a:pPr>
             <a:r>
-              <a:rPr lang="en-US" sz="900" dirty="0" smtClean="0">
-                <a:effectLst/>
-              </a:rPr>
-              <a:t>A</a:t>
+              <a:rPr lang="en-US" sz="900" dirty="0"/>
+              <a:t>a</a:t>
             </a:r>
             <a:r>
               <a:rPr lang="is-IS" sz="900" dirty="0" smtClean="0">
@@ -6177,10 +6235,8 @@
               <a:buChar char="•"/>
             </a:pPr>
             <a:r>
-              <a:rPr lang="en-US" sz="900" dirty="0" smtClean="0">
-                <a:effectLst/>
-              </a:rPr>
-              <a:t>H</a:t>
+              <a:rPr lang="en-US" sz="900" dirty="0"/>
+              <a:t>h</a:t>
             </a:r>
             <a:r>
               <a:rPr lang="hu-HU" sz="900" dirty="0" smtClean="0">
@@ -6421,7 +6477,7 @@
           <a:effectLst/>
           <a:extLst>
             <a:ext uri="{91240B29-F687-4f45-9708-019B960494DF}">
-              <a14:hiddenLine xmlns:a14="http://schemas.microsoft.com/office/drawing/2010/main" w="9525">
+              <a14:hiddenLine xmlns:a14="http://schemas.microsoft.com/office/drawing/2010/main" xmlns="" w="9525">
                 <a:solidFill>
                   <a:srgbClr val="000000"/>
                 </a:solidFill>
@@ -6431,7 +6487,7 @@
               </a14:hiddenLine>
             </a:ext>
             <a:ext uri="{AF507438-7753-43e0-B8FC-AC1667EBCBE1}">
-              <a14:hiddenEffects xmlns:a14="http://schemas.microsoft.com/office/drawing/2010/main">
+              <a14:hiddenEffects xmlns:a14="http://schemas.microsoft.com/office/drawing/2010/main" xmlns="">
                 <a:effectLst>
                   <a:outerShdw blurRad="63500" dist="38099" dir="2700000" algn="ctr" rotWithShape="0">
                     <a:srgbClr val="000000">
@@ -6856,7 +6912,7 @@
           <a:effectLst/>
           <a:extLst>
             <a:ext uri="{91240B29-F687-4f45-9708-019B960494DF}">
-              <a14:hiddenLine xmlns:a14="http://schemas.microsoft.com/office/drawing/2010/main" w="9525">
+              <a14:hiddenLine xmlns:a14="http://schemas.microsoft.com/office/drawing/2010/main" xmlns="" w="9525">
                 <a:solidFill>
                   <a:srgbClr val="000000"/>
                 </a:solidFill>
@@ -6866,7 +6922,7 @@
               </a14:hiddenLine>
             </a:ext>
             <a:ext uri="{AF507438-7753-43e0-B8FC-AC1667EBCBE1}">
-              <a14:hiddenEffects xmlns:a14="http://schemas.microsoft.com/office/drawing/2010/main">
+              <a14:hiddenEffects xmlns:a14="http://schemas.microsoft.com/office/drawing/2010/main" xmlns="">
                 <a:effectLst>
                   <a:outerShdw blurRad="63500" dist="38099" dir="2700000" algn="ctr" rotWithShape="0">
                     <a:srgbClr val="000000">
@@ -7241,7 +7297,7 @@
           <a:effectLst/>
           <a:extLst>
             <a:ext uri="{AF507438-7753-43e0-B8FC-AC1667EBCBE1}">
-              <a14:hiddenEffects xmlns:a14="http://schemas.microsoft.com/office/drawing/2010/main">
+              <a14:hiddenEffects xmlns:a14="http://schemas.microsoft.com/office/drawing/2010/main" xmlns="">
                 <a:effectLst>
                   <a:outerShdw blurRad="63500" dist="38099" dir="2700000" algn="ctr" rotWithShape="0">
                     <a:srgbClr val="000000">
@@ -7524,10 +7580,14 @@
               <a:buChar char="•"/>
             </a:pPr>
             <a:r>
-              <a:rPr lang="es-ES_tradnl" sz="900" dirty="0" smtClean="0">
+              <a:rPr lang="en-US" sz="900" dirty="0"/>
+              <a:t>s</a:t>
+            </a:r>
+            <a:r>
+              <a:rPr lang="es-ES_tradnl" sz="900" dirty="0" err="1" smtClean="0">
                 <a:effectLst/>
               </a:rPr>
-              <a:t>Sexual</a:t>
+              <a:t>exual</a:t>
             </a:r>
             <a:endParaRPr lang="is-IS" sz="900" dirty="0" smtClean="0">
               <a:effectLst/>
@@ -7540,10 +7600,14 @@
               <a:buChar char="•"/>
             </a:pPr>
             <a:r>
+              <a:rPr lang="es-ES_tradnl" sz="900" dirty="0"/>
+              <a:t>a</a:t>
+            </a:r>
+            <a:r>
               <a:rPr lang="es-ES_tradnl" sz="900" dirty="0" smtClean="0">
                 <a:effectLst/>
               </a:rPr>
-              <a:t>Asexual</a:t>
+              <a:t>sexual</a:t>
             </a:r>
             <a:endParaRPr lang="es-ES" sz="900" dirty="0"/>
           </a:p>
@@ -7574,7 +7638,7 @@
           <a:effectLst/>
           <a:extLst>
             <a:ext uri="{91240B29-F687-4f45-9708-019B960494DF}">
-              <a14:hiddenLine xmlns:a14="http://schemas.microsoft.com/office/drawing/2010/main" w="9525">
+              <a14:hiddenLine xmlns:a14="http://schemas.microsoft.com/office/drawing/2010/main" xmlns="" w="9525">
                 <a:solidFill>
                   <a:srgbClr val="000000"/>
                 </a:solidFill>
@@ -7584,7 +7648,7 @@
               </a14:hiddenLine>
             </a:ext>
             <a:ext uri="{AF507438-7753-43e0-B8FC-AC1667EBCBE1}">
-              <a14:hiddenEffects xmlns:a14="http://schemas.microsoft.com/office/drawing/2010/main">
+              <a14:hiddenEffects xmlns:a14="http://schemas.microsoft.com/office/drawing/2010/main" xmlns="">
                 <a:effectLst>
                   <a:outerShdw blurRad="63500" dist="38099" dir="2700000" algn="ctr" rotWithShape="0">
                     <a:srgbClr val="000000">
@@ -7960,7 +8024,7 @@
           <a:effectLst/>
           <a:extLst>
             <a:ext uri="{AF507438-7753-43e0-B8FC-AC1667EBCBE1}">
-              <a14:hiddenEffects xmlns:a14="http://schemas.microsoft.com/office/drawing/2010/main">
+              <a14:hiddenEffects xmlns:a14="http://schemas.microsoft.com/office/drawing/2010/main" xmlns="">
                 <a:effectLst>
                   <a:outerShdw blurRad="63500" dist="38099" dir="2700000" algn="ctr" rotWithShape="0">
                     <a:srgbClr val="000000">
@@ -8243,10 +8307,14 @@
               <a:buChar char="•"/>
             </a:pPr>
             <a:r>
-              <a:rPr lang="es-ES_tradnl" sz="900" dirty="0" smtClean="0">
+              <a:rPr lang="en-US" sz="900" dirty="0"/>
+              <a:t>e</a:t>
+            </a:r>
+            <a:r>
+              <a:rPr lang="es-ES_tradnl" sz="900" dirty="0" err="1" smtClean="0">
                 <a:effectLst/>
               </a:rPr>
-              <a:t>Estímulos</a:t>
+              <a:t>stímulos</a:t>
             </a:r>
             <a:endParaRPr lang="is-IS" sz="900" dirty="0" smtClean="0">
               <a:effectLst/>
@@ -8259,10 +8327,14 @@
               <a:buChar char="•"/>
             </a:pPr>
             <a:r>
+              <a:rPr lang="es-ES_tradnl" sz="900" dirty="0" smtClean="0"/>
+              <a:t>r</a:t>
+            </a:r>
+            <a:r>
               <a:rPr lang="es-ES_tradnl" sz="900" dirty="0" smtClean="0">
                 <a:effectLst/>
               </a:rPr>
-              <a:t>Respuestas</a:t>
+              <a:t>espuestas</a:t>
             </a:r>
             <a:endParaRPr lang="es-ES" sz="900" dirty="0"/>
           </a:p>
@@ -8293,7 +8365,7 @@
           <a:effectLst/>
           <a:extLst>
             <a:ext uri="{91240B29-F687-4f45-9708-019B960494DF}">
-              <a14:hiddenLine xmlns:a14="http://schemas.microsoft.com/office/drawing/2010/main" w="9525">
+              <a14:hiddenLine xmlns:a14="http://schemas.microsoft.com/office/drawing/2010/main" xmlns="" w="9525">
                 <a:solidFill>
                   <a:srgbClr val="000000"/>
                 </a:solidFill>
@@ -8303,7 +8375,7 @@
               </a14:hiddenLine>
             </a:ext>
             <a:ext uri="{AF507438-7753-43e0-B8FC-AC1667EBCBE1}">
-              <a14:hiddenEffects xmlns:a14="http://schemas.microsoft.com/office/drawing/2010/main">
+              <a14:hiddenEffects xmlns:a14="http://schemas.microsoft.com/office/drawing/2010/main" xmlns="">
                 <a:effectLst>
                   <a:outerShdw blurRad="63500" dist="38099" dir="2700000" algn="ctr" rotWithShape="0">
                     <a:srgbClr val="000000">
@@ -9073,7 +9145,7 @@
           <a:effectLst/>
           <a:extLst>
             <a:ext uri="{AF507438-7753-43e0-B8FC-AC1667EBCBE1}">
-              <a14:hiddenEffects xmlns:a14="http://schemas.microsoft.com/office/drawing/2010/main">
+              <a14:hiddenEffects xmlns:a14="http://schemas.microsoft.com/office/drawing/2010/main" xmlns="">
                 <a:effectLst>
                   <a:outerShdw blurRad="63500" dist="38099" dir="2700000" algn="ctr" rotWithShape="0">
                     <a:srgbClr val="000000">
@@ -9360,7 +9432,7 @@
                   <a:srgbClr val="FFFFFF"/>
                 </a:solidFill>
               </a:rPr>
-              <a:t>N</a:t>
+              <a:t>n</a:t>
             </a:r>
             <a:r>
               <a:rPr lang="es-ES_tradnl" sz="900" dirty="0" smtClean="0">
@@ -9382,7 +9454,7 @@
                   <a:srgbClr val="FFFFFF"/>
                 </a:solidFill>
               </a:rPr>
-              <a:t>N</a:t>
+              <a:t>n</a:t>
             </a:r>
             <a:r>
               <a:rPr lang="es-ES_tradnl" sz="900" dirty="0" smtClean="0">
@@ -9409,7 +9481,7 @@
                   <a:srgbClr val="FFFFFF"/>
                 </a:solidFill>
               </a:rPr>
-              <a:t>D</a:t>
+              <a:t>d</a:t>
             </a:r>
             <a:r>
               <a:rPr lang="es-ES_tradnl" sz="900" dirty="0" smtClean="0">
@@ -9447,7 +9519,7 @@
           <a:effectLst/>
           <a:extLst>
             <a:ext uri="{91240B29-F687-4f45-9708-019B960494DF}">
-              <a14:hiddenLine xmlns:a14="http://schemas.microsoft.com/office/drawing/2010/main" w="9525">
+              <a14:hiddenLine xmlns:a14="http://schemas.microsoft.com/office/drawing/2010/main" xmlns="" w="9525">
                 <a:solidFill>
                   <a:srgbClr val="000000"/>
                 </a:solidFill>
@@ -9457,7 +9529,7 @@
               </a14:hiddenLine>
             </a:ext>
             <a:ext uri="{AF507438-7753-43e0-B8FC-AC1667EBCBE1}">
-              <a14:hiddenEffects xmlns:a14="http://schemas.microsoft.com/office/drawing/2010/main">
+              <a14:hiddenEffects xmlns:a14="http://schemas.microsoft.com/office/drawing/2010/main" xmlns="">
                 <a:effectLst>
                   <a:outerShdw blurRad="63500" dist="38099" dir="2700000" algn="ctr" rotWithShape="0">
                     <a:srgbClr val="000000">
@@ -10282,7 +10354,7 @@
           <a:effectLst/>
           <a:extLst>
             <a:ext uri="{AF507438-7753-43e0-B8FC-AC1667EBCBE1}">
-              <a14:hiddenEffects xmlns:a14="http://schemas.microsoft.com/office/drawing/2010/main">
+              <a14:hiddenEffects xmlns:a14="http://schemas.microsoft.com/office/drawing/2010/main" xmlns="">
                 <a:effectLst>
                   <a:outerShdw blurRad="63500" dist="38099" dir="2700000" algn="ctr" rotWithShape="0">
                     <a:srgbClr val="000000">
@@ -10565,12 +10637,20 @@
               <a:buNone/>
             </a:pPr>
             <a:r>
+              <a:rPr lang="es-ES" sz="900" dirty="0">
+                <a:solidFill>
+                  <a:srgbClr val="FFFFFF"/>
+                </a:solidFill>
+              </a:rPr>
+              <a:t>b</a:t>
+            </a:r>
+            <a:r>
               <a:rPr lang="es-ES" sz="900" dirty="0" smtClean="0">
                 <a:solidFill>
                   <a:srgbClr val="FFFFFF"/>
                 </a:solidFill>
               </a:rPr>
-              <a:t>Bacteria</a:t>
+              <a:t>acteria</a:t>
             </a:r>
             <a:endParaRPr lang="es-ES" sz="900" dirty="0">
               <a:solidFill>
@@ -10610,7 +10690,7 @@
           <a:effectLst/>
           <a:extLst>
             <a:ext uri="{AF507438-7753-43e0-B8FC-AC1667EBCBE1}">
-              <a14:hiddenEffects xmlns:a14="http://schemas.microsoft.com/office/drawing/2010/main">
+              <a14:hiddenEffects xmlns:a14="http://schemas.microsoft.com/office/drawing/2010/main" xmlns="">
                 <a:effectLst>
                   <a:outerShdw blurRad="63500" dist="38099" dir="2700000" algn="ctr" rotWithShape="0">
                     <a:srgbClr val="000000">
@@ -10893,12 +10973,20 @@
               <a:buNone/>
             </a:pPr>
             <a:r>
+              <a:rPr lang="es-ES" sz="900" dirty="0" err="1">
+                <a:solidFill>
+                  <a:srgbClr val="FFFFFF"/>
+                </a:solidFill>
+              </a:rPr>
+              <a:t>e</a:t>
+            </a:r>
+            <a:r>
               <a:rPr lang="es-ES" sz="900" dirty="0" err="1" smtClean="0">
                 <a:solidFill>
                   <a:srgbClr val="FFFFFF"/>
                 </a:solidFill>
               </a:rPr>
-              <a:t>Eucaria</a:t>
+              <a:t>ucaria</a:t>
             </a:r>
             <a:endParaRPr lang="es-ES" sz="900" dirty="0">
               <a:solidFill>
@@ -10938,7 +11026,7 @@
           <a:effectLst/>
           <a:extLst>
             <a:ext uri="{AF507438-7753-43e0-B8FC-AC1667EBCBE1}">
-              <a14:hiddenEffects xmlns:a14="http://schemas.microsoft.com/office/drawing/2010/main">
+              <a14:hiddenEffects xmlns:a14="http://schemas.microsoft.com/office/drawing/2010/main" xmlns="">
                 <a:effectLst>
                   <a:outerShdw blurRad="63500" dist="38099" dir="2700000" algn="ctr" rotWithShape="0">
                     <a:srgbClr val="000000">
@@ -11221,12 +11309,20 @@
               <a:buNone/>
             </a:pPr>
             <a:r>
+              <a:rPr lang="es-ES" sz="900" dirty="0">
+                <a:solidFill>
+                  <a:srgbClr val="FFFFFF"/>
+                </a:solidFill>
+              </a:rPr>
+              <a:t>a</a:t>
+            </a:r>
+            <a:r>
               <a:rPr lang="es-ES" sz="900" dirty="0" smtClean="0">
                 <a:solidFill>
                   <a:srgbClr val="FFFFFF"/>
                 </a:solidFill>
               </a:rPr>
-              <a:t>Arquea</a:t>
+              <a:t>rquea</a:t>
             </a:r>
             <a:endParaRPr lang="es-ES" sz="900" dirty="0">
               <a:solidFill>
@@ -11261,7 +11357,7 @@
           <a:effectLst/>
           <a:extLst>
             <a:ext uri="{91240B29-F687-4f45-9708-019B960494DF}">
-              <a14:hiddenLine xmlns:a14="http://schemas.microsoft.com/office/drawing/2010/main" w="9525">
+              <a14:hiddenLine xmlns:a14="http://schemas.microsoft.com/office/drawing/2010/main" xmlns="" w="9525">
                 <a:solidFill>
                   <a:srgbClr val="000000"/>
                 </a:solidFill>
@@ -11271,7 +11367,7 @@
               </a14:hiddenLine>
             </a:ext>
             <a:ext uri="{AF507438-7753-43e0-B8FC-AC1667EBCBE1}">
-              <a14:hiddenEffects xmlns:a14="http://schemas.microsoft.com/office/drawing/2010/main">
+              <a14:hiddenEffects xmlns:a14="http://schemas.microsoft.com/office/drawing/2010/main" xmlns="">
                 <a:effectLst>
                   <a:outerShdw blurRad="63500" dist="38099" dir="2700000" algn="ctr" rotWithShape="0">
                     <a:srgbClr val="000000">
@@ -11591,7 +11687,7 @@
           <a:effectLst/>
           <a:extLst>
             <a:ext uri="{AF507438-7753-43e0-B8FC-AC1667EBCBE1}">
-              <a14:hiddenEffects xmlns:a14="http://schemas.microsoft.com/office/drawing/2010/main">
+              <a14:hiddenEffects xmlns:a14="http://schemas.microsoft.com/office/drawing/2010/main" xmlns="">
                 <a:effectLst>
                   <a:outerShdw blurRad="63500" dist="38099" dir="2700000" algn="ctr" rotWithShape="0">
                     <a:srgbClr val="000000">
@@ -11874,7 +11970,7 @@
             </a:pPr>
             <a:r>
               <a:rPr lang="es-ES_tradnl" sz="900" dirty="0"/>
-              <a:t>U</a:t>
+              <a:t>u</a:t>
             </a:r>
             <a:r>
               <a:rPr lang="es-ES_tradnl" sz="900" dirty="0" smtClean="0">
@@ -11896,7 +11992,7 @@
                   <a:srgbClr val="FF0000"/>
                 </a:solidFill>
               </a:rPr>
-              <a:t>P</a:t>
+              <a:t>p</a:t>
             </a:r>
             <a:r>
               <a:rPr lang="es-ES_tradnl" sz="900" dirty="0" smtClean="0">
@@ -11996,7 +12092,7 @@
           <a:effectLst/>
           <a:extLst>
             <a:ext uri="{91240B29-F687-4f45-9708-019B960494DF}">
-              <a14:hiddenLine xmlns:a14="http://schemas.microsoft.com/office/drawing/2010/main" w="9525">
+              <a14:hiddenLine xmlns:a14="http://schemas.microsoft.com/office/drawing/2010/main" xmlns="" w="9525">
                 <a:solidFill>
                   <a:srgbClr val="000000"/>
                 </a:solidFill>
@@ -12006,7 +12102,7 @@
               </a14:hiddenLine>
             </a:ext>
             <a:ext uri="{AF507438-7753-43e0-B8FC-AC1667EBCBE1}">
-              <a14:hiddenEffects xmlns:a14="http://schemas.microsoft.com/office/drawing/2010/main">
+              <a14:hiddenEffects xmlns:a14="http://schemas.microsoft.com/office/drawing/2010/main" xmlns="">
                 <a:effectLst>
                   <a:outerShdw blurRad="63500" dist="38099" dir="2700000" algn="ctr" rotWithShape="0">
                     <a:srgbClr val="000000">
@@ -12326,7 +12422,7 @@
           <a:effectLst/>
           <a:extLst>
             <a:ext uri="{AF507438-7753-43e0-B8FC-AC1667EBCBE1}">
-              <a14:hiddenEffects xmlns:a14="http://schemas.microsoft.com/office/drawing/2010/main">
+              <a14:hiddenEffects xmlns:a14="http://schemas.microsoft.com/office/drawing/2010/main" xmlns="">
                 <a:effectLst>
                   <a:outerShdw blurRad="63500" dist="38099" dir="2700000" algn="ctr" rotWithShape="0">
                     <a:srgbClr val="000000">
@@ -12609,7 +12705,7 @@
             </a:pPr>
             <a:r>
               <a:rPr lang="es-ES_tradnl" sz="900" dirty="0"/>
-              <a:t>U</a:t>
+              <a:t>u</a:t>
             </a:r>
             <a:r>
               <a:rPr lang="es-ES_tradnl" sz="900" dirty="0" smtClean="0">
@@ -12631,7 +12727,7 @@
                   <a:srgbClr val="FF0000"/>
                 </a:solidFill>
               </a:rPr>
-              <a:t>C</a:t>
+              <a:t>c</a:t>
             </a:r>
             <a:r>
               <a:rPr lang="pt-BR" sz="900" dirty="0" err="1" smtClean="0">
@@ -12740,7 +12836,7 @@
           <a:effectLst/>
           <a:extLst>
             <a:ext uri="{91240B29-F687-4f45-9708-019B960494DF}">
-              <a14:hiddenLine xmlns:a14="http://schemas.microsoft.com/office/drawing/2010/main" w="9525">
+              <a14:hiddenLine xmlns:a14="http://schemas.microsoft.com/office/drawing/2010/main" xmlns="" w="9525">
                 <a:solidFill>
                   <a:srgbClr val="000000"/>
                 </a:solidFill>
@@ -12750,7 +12846,7 @@
               </a14:hiddenLine>
             </a:ext>
             <a:ext uri="{AF507438-7753-43e0-B8FC-AC1667EBCBE1}">
-              <a14:hiddenEffects xmlns:a14="http://schemas.microsoft.com/office/drawing/2010/main">
+              <a14:hiddenEffects xmlns:a14="http://schemas.microsoft.com/office/drawing/2010/main" xmlns="">
                 <a:effectLst>
                   <a:outerShdw blurRad="63500" dist="38099" dir="2700000" algn="ctr" rotWithShape="0">
                     <a:srgbClr val="000000">
@@ -13070,7 +13166,7 @@
           <a:effectLst/>
           <a:extLst>
             <a:ext uri="{AF507438-7753-43e0-B8FC-AC1667EBCBE1}">
-              <a14:hiddenEffects xmlns:a14="http://schemas.microsoft.com/office/drawing/2010/main">
+              <a14:hiddenEffects xmlns:a14="http://schemas.microsoft.com/office/drawing/2010/main" xmlns="">
                 <a:effectLst>
                   <a:outerShdw blurRad="63500" dist="38099" dir="2700000" algn="ctr" rotWithShape="0">
                     <a:srgbClr val="000000">
@@ -13353,7 +13449,7 @@
             </a:pPr>
             <a:r>
               <a:rPr lang="pt-BR" sz="900" dirty="0"/>
-              <a:t>U</a:t>
+              <a:t>u</a:t>
             </a:r>
             <a:r>
               <a:rPr lang="pt-BR" sz="900" dirty="0" smtClean="0">
@@ -13373,7 +13469,7 @@
                   <a:srgbClr val="FF0000"/>
                 </a:solidFill>
               </a:rPr>
-              <a:t>C</a:t>
+              <a:t>c</a:t>
             </a:r>
             <a:r>
               <a:rPr lang="pt-BR" sz="900" dirty="0" err="1" smtClean="0">
@@ -13484,7 +13580,7 @@
           <a:effectLst/>
           <a:extLst>
             <a:ext uri="{91240B29-F687-4f45-9708-019B960494DF}">
-              <a14:hiddenLine xmlns:a14="http://schemas.microsoft.com/office/drawing/2010/main" w="9525">
+              <a14:hiddenLine xmlns:a14="http://schemas.microsoft.com/office/drawing/2010/main" xmlns="" w="9525">
                 <a:solidFill>
                   <a:srgbClr val="000000"/>
                 </a:solidFill>
@@ -13494,7 +13590,7 @@
               </a14:hiddenLine>
             </a:ext>
             <a:ext uri="{AF507438-7753-43e0-B8FC-AC1667EBCBE1}">
-              <a14:hiddenEffects xmlns:a14="http://schemas.microsoft.com/office/drawing/2010/main">
+              <a14:hiddenEffects xmlns:a14="http://schemas.microsoft.com/office/drawing/2010/main" xmlns="">
                 <a:effectLst>
                   <a:outerShdw blurRad="63500" dist="38099" dir="2700000" algn="ctr" rotWithShape="0">
                     <a:srgbClr val="000000">
@@ -13814,7 +13910,7 @@
           <a:effectLst/>
           <a:extLst>
             <a:ext uri="{AF507438-7753-43e0-B8FC-AC1667EBCBE1}">
-              <a14:hiddenEffects xmlns:a14="http://schemas.microsoft.com/office/drawing/2010/main">
+              <a14:hiddenEffects xmlns:a14="http://schemas.microsoft.com/office/drawing/2010/main" xmlns="">
                 <a:effectLst>
                   <a:outerShdw blurRad="63500" dist="38099" dir="2700000" algn="ctr" rotWithShape="0">
                     <a:srgbClr val="000000">
@@ -14093,8 +14189,12 @@
           <a:p>
             <a:pPr algn="ctr"/>
             <a:r>
+              <a:rPr lang="es-ES_tradnl" sz="900" dirty="0"/>
+              <a:t>c</a:t>
+            </a:r>
+            <a:r>
               <a:rPr lang="es-ES_tradnl" sz="900" dirty="0" smtClean="0"/>
-              <a:t>Cuatro reinos</a:t>
+              <a:t>uatro reinos</a:t>
             </a:r>
             <a:endParaRPr lang="es-ES" sz="900" dirty="0"/>
           </a:p>
@@ -14185,7 +14285,7 @@
           <a:effectLst/>
           <a:extLst>
             <a:ext uri="{AF507438-7753-43e0-B8FC-AC1667EBCBE1}">
-              <a14:hiddenEffects xmlns:a14="http://schemas.microsoft.com/office/drawing/2010/main">
+              <a14:hiddenEffects xmlns:a14="http://schemas.microsoft.com/office/drawing/2010/main" xmlns="">
                 <a:effectLst>
                   <a:outerShdw blurRad="63500" dist="38099" dir="2700000" algn="ctr" rotWithShape="0">
                     <a:srgbClr val="000000">
@@ -14469,7 +14569,7 @@
             </a:pPr>
             <a:r>
               <a:rPr lang="cs-CZ" sz="900" dirty="0"/>
-              <a:t>P</a:t>
+              <a:t>p</a:t>
             </a:r>
             <a:r>
               <a:rPr lang="cs-CZ" sz="900" dirty="0" smtClean="0">
@@ -14486,7 +14586,7 @@
             </a:pPr>
             <a:r>
               <a:rPr lang="es-ES_tradnl" sz="900" dirty="0"/>
-              <a:t>H</a:t>
+              <a:t>h</a:t>
             </a:r>
             <a:r>
               <a:rPr lang="es-ES_tradnl" sz="900" dirty="0" smtClean="0">
@@ -14502,10 +14602,8 @@
               <a:buChar char="•"/>
             </a:pPr>
             <a:r>
-              <a:rPr lang="en-US" sz="900" dirty="0" smtClean="0">
-                <a:effectLst/>
-              </a:rPr>
-              <a:t>P</a:t>
+              <a:rPr lang="en-US" sz="900" dirty="0"/>
+              <a:t>p</a:t>
             </a:r>
             <a:r>
               <a:rPr lang="pt-BR" sz="900" dirty="0" err="1" smtClean="0">
@@ -14525,7 +14623,7 @@
             </a:pPr>
             <a:r>
               <a:rPr lang="es-ES_tradnl" sz="900" dirty="0"/>
-              <a:t>A</a:t>
+              <a:t>a</a:t>
             </a:r>
             <a:r>
               <a:rPr lang="es-ES_tradnl" sz="900" dirty="0" smtClean="0">
@@ -14733,7 +14831,7 @@
   <p:timing>
     <p:tnLst>
       <p:par>
-        <p:cTn xmlns:p14="http://schemas.microsoft.com/office/powerpoint/2010/main" id="1" dur="indefinite" restart="never" nodeType="tmRoot"/>
+        <p:cTn id="1" dur="indefinite" restart="never" nodeType="tmRoot"/>
       </p:par>
     </p:tnLst>
   </p:timing>
@@ -14995,7 +15093,7 @@
   <a:extraClrSchemeLst/>
   <a:extLst>
     <a:ext uri="{05A4C25C-085E-4340-85A3-A5531E510DB2}">
-      <thm15:themeFamily xmlns="" xmlns:thm15="http://schemas.microsoft.com/office/thememl/2012/main" name="Office Theme" id="{62F939B6-93AF-4DB8-9C6B-D6C7DFDC589F}" vid="{4A3C46E8-61CC-4603-A589-7422A47A8E4A}"/>
+      <thm15:themeFamily xmlns:thm15="http://schemas.microsoft.com/office/thememl/2012/main" name="Office Theme" id="{62F939B6-93AF-4DB8-9C6B-D6C7DFDC589F}" vid="{4A3C46E8-61CC-4603-A589-7422A47A8E4A}"/>
     </a:ext>
   </a:extLst>
 </a:theme>

</xml_diff>

<commit_message>
Mapa 06 03 actualizado
Mapa 06 03 actualizado
</commit_message>
<xml_diff>
--- a/fuentes/contenidos/grado06/guion03/CN_06_03.pptx
+++ b/fuentes/contenidos/grado06/guion03/CN_06_03.pptx
@@ -461,7 +461,7 @@
           <a:p>
             <a:fld id="{5001C876-01F7-4317-94B9-1AE222133113}" type="datetimeFigureOut">
               <a:rPr lang="es-ES" smtClean="0"/>
-              <a:t>23/09/2015</a:t>
+              <a:t>07/10/2015</a:t>
             </a:fld>
             <a:endParaRPr lang="es-ES"/>
           </a:p>
@@ -1059,7 +1059,7 @@
           <a:effectLst/>
           <a:extLst>
             <a:ext uri="{AF507438-7753-43e0-B8FC-AC1667EBCBE1}">
-              <a14:hiddenEffects xmlns:a14="http://schemas.microsoft.com/office/drawing/2010/main" xmlns="">
+              <a14:hiddenEffects xmlns="" xmlns:a14="http://schemas.microsoft.com/office/drawing/2010/main">
                 <a:effectLst>
                   <a:outerShdw blurRad="63500" dist="38099" dir="2700000" algn="ctr" rotWithShape="0">
                     <a:srgbClr val="000000">
@@ -1485,7 +1485,7 @@
           <a:effectLst/>
           <a:extLst>
             <a:ext uri="{91240B29-F687-4f45-9708-019B960494DF}">
-              <a14:hiddenLine xmlns:a14="http://schemas.microsoft.com/office/drawing/2010/main" xmlns="" w="9525">
+              <a14:hiddenLine xmlns="" xmlns:a14="http://schemas.microsoft.com/office/drawing/2010/main" w="9525">
                 <a:solidFill>
                   <a:srgbClr val="000000"/>
                 </a:solidFill>
@@ -1495,7 +1495,7 @@
               </a14:hiddenLine>
             </a:ext>
             <a:ext uri="{AF507438-7753-43e0-B8FC-AC1667EBCBE1}">
-              <a14:hiddenEffects xmlns:a14="http://schemas.microsoft.com/office/drawing/2010/main" xmlns="">
+              <a14:hiddenEffects xmlns="" xmlns:a14="http://schemas.microsoft.com/office/drawing/2010/main">
                 <a:effectLst>
                   <a:outerShdw blurRad="63500" dist="38099" dir="2700000" algn="ctr" rotWithShape="0">
                     <a:srgbClr val="000000">
@@ -1779,7 +1779,15 @@
             </a:pPr>
             <a:r>
               <a:rPr lang="es-ES" sz="900" dirty="0" smtClean="0"/>
-              <a:t>se caracteriza por</a:t>
+              <a:t>se </a:t>
+            </a:r>
+            <a:r>
+              <a:rPr lang="es-ES" sz="900" dirty="0" smtClean="0"/>
+              <a:t>caracterizan </a:t>
+            </a:r>
+            <a:r>
+              <a:rPr lang="es-ES" sz="900" dirty="0" smtClean="0"/>
+              <a:t>por</a:t>
             </a:r>
             <a:endParaRPr lang="es-ES" sz="900" dirty="0"/>
           </a:p>
@@ -1810,7 +1818,7 @@
           <a:effectLst/>
           <a:extLst>
             <a:ext uri="{91240B29-F687-4f45-9708-019B960494DF}">
-              <a14:hiddenLine xmlns:a14="http://schemas.microsoft.com/office/drawing/2010/main" xmlns="" w="9525">
+              <a14:hiddenLine xmlns="" xmlns:a14="http://schemas.microsoft.com/office/drawing/2010/main" w="9525">
                 <a:solidFill>
                   <a:srgbClr val="000000"/>
                 </a:solidFill>
@@ -1820,7 +1828,7 @@
               </a14:hiddenLine>
             </a:ext>
             <a:ext uri="{AF507438-7753-43e0-B8FC-AC1667EBCBE1}">
-              <a14:hiddenEffects xmlns:a14="http://schemas.microsoft.com/office/drawing/2010/main" xmlns="">
+              <a14:hiddenEffects xmlns="" xmlns:a14="http://schemas.microsoft.com/office/drawing/2010/main">
                 <a:effectLst>
                   <a:outerShdw blurRad="63500" dist="38099" dir="2700000" algn="ctr" rotWithShape="0">
                     <a:srgbClr val="000000">
@@ -2135,7 +2143,7 @@
           <a:effectLst/>
           <a:extLst>
             <a:ext uri="{91240B29-F687-4f45-9708-019B960494DF}">
-              <a14:hiddenLine xmlns:a14="http://schemas.microsoft.com/office/drawing/2010/main" xmlns="" w="9525">
+              <a14:hiddenLine xmlns="" xmlns:a14="http://schemas.microsoft.com/office/drawing/2010/main" w="9525">
                 <a:solidFill>
                   <a:srgbClr val="000000"/>
                 </a:solidFill>
@@ -2145,7 +2153,7 @@
               </a14:hiddenLine>
             </a:ext>
             <a:ext uri="{AF507438-7753-43e0-B8FC-AC1667EBCBE1}">
-              <a14:hiddenEffects xmlns:a14="http://schemas.microsoft.com/office/drawing/2010/main" xmlns="">
+              <a14:hiddenEffects xmlns="" xmlns:a14="http://schemas.microsoft.com/office/drawing/2010/main">
                 <a:effectLst>
                   <a:outerShdw blurRad="63500" dist="38099" dir="2700000" algn="ctr" rotWithShape="0">
                     <a:srgbClr val="000000">
@@ -2822,12 +2830,12 @@
               <a:buNone/>
             </a:pPr>
             <a:r>
-              <a:rPr lang="es-ES" sz="1300" b="1" dirty="0"/>
-              <a:t>C</a:t>
+              <a:rPr lang="es-ES" sz="1300" b="1" dirty="0" smtClean="0"/>
+              <a:t>Estar c</a:t>
             </a:r>
             <a:r>
               <a:rPr lang="es-ES" sz="1300" b="1" dirty="0" smtClean="0"/>
-              <a:t>omposición</a:t>
+              <a:t>ompuestos</a:t>
             </a:r>
             <a:endParaRPr lang="es-ES" sz="1300" b="1" dirty="0"/>
           </a:p>
@@ -3260,7 +3268,7 @@
           <a:effectLst/>
           <a:extLst>
             <a:ext uri="{91240B29-F687-4f45-9708-019B960494DF}">
-              <a14:hiddenLine xmlns:a14="http://schemas.microsoft.com/office/drawing/2010/main" xmlns="" w="9525">
+              <a14:hiddenLine xmlns="" xmlns:a14="http://schemas.microsoft.com/office/drawing/2010/main" w="9525">
                 <a:solidFill>
                   <a:srgbClr val="000000"/>
                 </a:solidFill>
@@ -3270,7 +3278,7 @@
               </a14:hiddenLine>
             </a:ext>
             <a:ext uri="{AF507438-7753-43e0-B8FC-AC1667EBCBE1}">
-              <a14:hiddenEffects xmlns:a14="http://schemas.microsoft.com/office/drawing/2010/main" xmlns="">
+              <a14:hiddenEffects xmlns="" xmlns:a14="http://schemas.microsoft.com/office/drawing/2010/main">
                 <a:effectLst>
                   <a:outerShdw blurRad="63500" dist="38099" dir="2700000" algn="ctr" rotWithShape="0">
                     <a:srgbClr val="000000">
@@ -3590,7 +3598,7 @@
           <a:effectLst/>
           <a:extLst>
             <a:ext uri="{AF507438-7753-43e0-B8FC-AC1667EBCBE1}">
-              <a14:hiddenEffects xmlns:a14="http://schemas.microsoft.com/office/drawing/2010/main" xmlns="">
+              <a14:hiddenEffects xmlns="" xmlns:a14="http://schemas.microsoft.com/office/drawing/2010/main">
                 <a:effectLst>
                   <a:outerShdw blurRad="63500" dist="38099" dir="2700000" algn="ctr" rotWithShape="0">
                     <a:srgbClr val="000000">
@@ -3926,7 +3934,7 @@
           <a:effectLst/>
           <a:extLst>
             <a:ext uri="{AF507438-7753-43e0-B8FC-AC1667EBCBE1}">
-              <a14:hiddenEffects xmlns:a14="http://schemas.microsoft.com/office/drawing/2010/main" xmlns="">
+              <a14:hiddenEffects xmlns="" xmlns:a14="http://schemas.microsoft.com/office/drawing/2010/main">
                 <a:effectLst>
                   <a:outerShdw blurRad="63500" dist="38099" dir="2700000" algn="ctr" rotWithShape="0">
                     <a:srgbClr val="000000">
@@ -4262,7 +4270,7 @@
           <a:effectLst/>
           <a:extLst>
             <a:ext uri="{AF507438-7753-43e0-B8FC-AC1667EBCBE1}">
-              <a14:hiddenEffects xmlns:a14="http://schemas.microsoft.com/office/drawing/2010/main" xmlns="">
+              <a14:hiddenEffects xmlns="" xmlns:a14="http://schemas.microsoft.com/office/drawing/2010/main">
                 <a:effectLst>
                   <a:outerShdw blurRad="63500" dist="38099" dir="2700000" algn="ctr" rotWithShape="0">
                     <a:srgbClr val="000000">
@@ -4598,7 +4606,7 @@
           <a:effectLst/>
           <a:extLst>
             <a:ext uri="{AF507438-7753-43e0-B8FC-AC1667EBCBE1}">
-              <a14:hiddenEffects xmlns:a14="http://schemas.microsoft.com/office/drawing/2010/main" xmlns="">
+              <a14:hiddenEffects xmlns="" xmlns:a14="http://schemas.microsoft.com/office/drawing/2010/main">
                 <a:effectLst>
                   <a:outerShdw blurRad="63500" dist="38099" dir="2700000" algn="ctr" rotWithShape="0">
                     <a:srgbClr val="000000">
@@ -4934,7 +4942,7 @@
           <a:effectLst/>
           <a:extLst>
             <a:ext uri="{AF507438-7753-43e0-B8FC-AC1667EBCBE1}">
-              <a14:hiddenEffects xmlns:a14="http://schemas.microsoft.com/office/drawing/2010/main" xmlns="">
+              <a14:hiddenEffects xmlns="" xmlns:a14="http://schemas.microsoft.com/office/drawing/2010/main">
                 <a:effectLst>
                   <a:outerShdw blurRad="63500" dist="38099" dir="2700000" algn="ctr" rotWithShape="0">
                     <a:srgbClr val="000000">
@@ -5265,7 +5273,7 @@
           <a:effectLst/>
           <a:extLst>
             <a:ext uri="{91240B29-F687-4f45-9708-019B960494DF}">
-              <a14:hiddenLine xmlns:a14="http://schemas.microsoft.com/office/drawing/2010/main" xmlns="" w="9525">
+              <a14:hiddenLine xmlns="" xmlns:a14="http://schemas.microsoft.com/office/drawing/2010/main" w="9525">
                 <a:solidFill>
                   <a:srgbClr val="000000"/>
                 </a:solidFill>
@@ -5275,7 +5283,7 @@
               </a14:hiddenLine>
             </a:ext>
             <a:ext uri="{AF507438-7753-43e0-B8FC-AC1667EBCBE1}">
-              <a14:hiddenEffects xmlns:a14="http://schemas.microsoft.com/office/drawing/2010/main" xmlns="">
+              <a14:hiddenEffects xmlns="" xmlns:a14="http://schemas.microsoft.com/office/drawing/2010/main">
                 <a:effectLst>
                   <a:outerShdw blurRad="63500" dist="38099" dir="2700000" algn="ctr" rotWithShape="0">
                     <a:srgbClr val="000000">
@@ -5558,8 +5566,16 @@
               <a:buNone/>
             </a:pPr>
             <a:r>
+              <a:rPr lang="es-ES" sz="900" dirty="0"/>
+              <a:t>q</a:t>
+            </a:r>
+            <a:r>
               <a:rPr lang="es-ES" sz="900" dirty="0" smtClean="0"/>
-              <a:t>pueden ser</a:t>
+              <a:t>ue pueden </a:t>
+            </a:r>
+            <a:r>
+              <a:rPr lang="es-ES" sz="900" dirty="0" smtClean="0"/>
+              <a:t>ser</a:t>
             </a:r>
             <a:endParaRPr lang="es-ES" sz="900" dirty="0"/>
           </a:p>
@@ -5595,7 +5611,7 @@
           <a:effectLst/>
           <a:extLst>
             <a:ext uri="{AF507438-7753-43e0-B8FC-AC1667EBCBE1}">
-              <a14:hiddenEffects xmlns:a14="http://schemas.microsoft.com/office/drawing/2010/main" xmlns="">
+              <a14:hiddenEffects xmlns="" xmlns:a14="http://schemas.microsoft.com/office/drawing/2010/main">
                 <a:effectLst>
                   <a:outerShdw blurRad="63500" dist="38099" dir="2700000" algn="ctr" rotWithShape="0">
                     <a:srgbClr val="000000">
@@ -5935,7 +5951,7 @@
           <a:effectLst/>
           <a:extLst>
             <a:ext uri="{AF507438-7753-43e0-B8FC-AC1667EBCBE1}">
-              <a14:hiddenEffects xmlns:a14="http://schemas.microsoft.com/office/drawing/2010/main" xmlns="">
+              <a14:hiddenEffects xmlns="" xmlns:a14="http://schemas.microsoft.com/office/drawing/2010/main">
                 <a:effectLst>
                   <a:outerShdw blurRad="63500" dist="38099" dir="2700000" algn="ctr" rotWithShape="0">
                     <a:srgbClr val="000000">
@@ -6477,7 +6493,7 @@
           <a:effectLst/>
           <a:extLst>
             <a:ext uri="{91240B29-F687-4f45-9708-019B960494DF}">
-              <a14:hiddenLine xmlns:a14="http://schemas.microsoft.com/office/drawing/2010/main" xmlns="" w="9525">
+              <a14:hiddenLine xmlns="" xmlns:a14="http://schemas.microsoft.com/office/drawing/2010/main" w="9525">
                 <a:solidFill>
                   <a:srgbClr val="000000"/>
                 </a:solidFill>
@@ -6487,7 +6503,7 @@
               </a14:hiddenLine>
             </a:ext>
             <a:ext uri="{AF507438-7753-43e0-B8FC-AC1667EBCBE1}">
-              <a14:hiddenEffects xmlns:a14="http://schemas.microsoft.com/office/drawing/2010/main" xmlns="">
+              <a14:hiddenEffects xmlns="" xmlns:a14="http://schemas.microsoft.com/office/drawing/2010/main">
                 <a:effectLst>
                   <a:outerShdw blurRad="63500" dist="38099" dir="2700000" algn="ctr" rotWithShape="0">
                     <a:srgbClr val="000000">
@@ -6770,8 +6786,12 @@
               <a:buNone/>
             </a:pPr>
             <a:r>
+              <a:rPr lang="es-ES" sz="900" dirty="0"/>
+              <a:t>l</a:t>
+            </a:r>
+            <a:r>
               <a:rPr lang="es-ES" sz="900" dirty="0" smtClean="0"/>
-              <a:t>tales como</a:t>
+              <a:t>as cuales son</a:t>
             </a:r>
             <a:endParaRPr lang="es-ES" sz="900" dirty="0"/>
           </a:p>
@@ -6912,7 +6932,7 @@
           <a:effectLst/>
           <a:extLst>
             <a:ext uri="{91240B29-F687-4f45-9708-019B960494DF}">
-              <a14:hiddenLine xmlns:a14="http://schemas.microsoft.com/office/drawing/2010/main" xmlns="" w="9525">
+              <a14:hiddenLine xmlns="" xmlns:a14="http://schemas.microsoft.com/office/drawing/2010/main" w="9525">
                 <a:solidFill>
                   <a:srgbClr val="000000"/>
                 </a:solidFill>
@@ -6922,7 +6942,7 @@
               </a14:hiddenLine>
             </a:ext>
             <a:ext uri="{AF507438-7753-43e0-B8FC-AC1667EBCBE1}">
-              <a14:hiddenEffects xmlns:a14="http://schemas.microsoft.com/office/drawing/2010/main" xmlns="">
+              <a14:hiddenEffects xmlns="" xmlns:a14="http://schemas.microsoft.com/office/drawing/2010/main">
                 <a:effectLst>
                   <a:outerShdw blurRad="63500" dist="38099" dir="2700000" algn="ctr" rotWithShape="0">
                     <a:srgbClr val="000000">
@@ -7205,8 +7225,16 @@
               <a:buNone/>
             </a:pPr>
             <a:r>
+              <a:rPr lang="es-ES" sz="900" dirty="0"/>
+              <a:t>q</a:t>
+            </a:r>
+            <a:r>
               <a:rPr lang="es-ES" sz="900" dirty="0" smtClean="0"/>
-              <a:t>pueden ser</a:t>
+              <a:t>ue puede </a:t>
+            </a:r>
+            <a:r>
+              <a:rPr lang="es-ES" sz="900" dirty="0" smtClean="0"/>
+              <a:t>ser</a:t>
             </a:r>
             <a:endParaRPr lang="es-ES" sz="900" dirty="0"/>
           </a:p>
@@ -7297,7 +7325,7 @@
           <a:effectLst/>
           <a:extLst>
             <a:ext uri="{AF507438-7753-43e0-B8FC-AC1667EBCBE1}">
-              <a14:hiddenEffects xmlns:a14="http://schemas.microsoft.com/office/drawing/2010/main" xmlns="">
+              <a14:hiddenEffects xmlns="" xmlns:a14="http://schemas.microsoft.com/office/drawing/2010/main">
                 <a:effectLst>
                   <a:outerShdw blurRad="63500" dist="38099" dir="2700000" algn="ctr" rotWithShape="0">
                     <a:srgbClr val="000000">
@@ -7638,7 +7666,7 @@
           <a:effectLst/>
           <a:extLst>
             <a:ext uri="{91240B29-F687-4f45-9708-019B960494DF}">
-              <a14:hiddenLine xmlns:a14="http://schemas.microsoft.com/office/drawing/2010/main" xmlns="" w="9525">
+              <a14:hiddenLine xmlns="" xmlns:a14="http://schemas.microsoft.com/office/drawing/2010/main" w="9525">
                 <a:solidFill>
                   <a:srgbClr val="000000"/>
                 </a:solidFill>
@@ -7648,7 +7676,7 @@
               </a14:hiddenLine>
             </a:ext>
             <a:ext uri="{AF507438-7753-43e0-B8FC-AC1667EBCBE1}">
-              <a14:hiddenEffects xmlns:a14="http://schemas.microsoft.com/office/drawing/2010/main" xmlns="">
+              <a14:hiddenEffects xmlns="" xmlns:a14="http://schemas.microsoft.com/office/drawing/2010/main">
                 <a:effectLst>
                   <a:outerShdw blurRad="63500" dist="38099" dir="2700000" algn="ctr" rotWithShape="0">
                     <a:srgbClr val="000000">
@@ -7932,7 +7960,15 @@
             </a:pPr>
             <a:r>
               <a:rPr lang="es-ES" sz="900" dirty="0" smtClean="0"/>
-              <a:t>pueden ser</a:t>
+              <a:t>qu</a:t>
+            </a:r>
+            <a:r>
+              <a:rPr lang="es-ES" sz="900" dirty="0" smtClean="0"/>
+              <a:t>e puede </a:t>
+            </a:r>
+            <a:r>
+              <a:rPr lang="es-ES" sz="900" dirty="0" smtClean="0"/>
+              <a:t>ser</a:t>
             </a:r>
             <a:endParaRPr lang="es-ES" sz="900" dirty="0"/>
           </a:p>
@@ -8024,7 +8060,7 @@
           <a:effectLst/>
           <a:extLst>
             <a:ext uri="{AF507438-7753-43e0-B8FC-AC1667EBCBE1}">
-              <a14:hiddenEffects xmlns:a14="http://schemas.microsoft.com/office/drawing/2010/main" xmlns="">
+              <a14:hiddenEffects xmlns="" xmlns:a14="http://schemas.microsoft.com/office/drawing/2010/main">
                 <a:effectLst>
                   <a:outerShdw blurRad="63500" dist="38099" dir="2700000" algn="ctr" rotWithShape="0">
                     <a:srgbClr val="000000">
@@ -8307,14 +8343,10 @@
               <a:buChar char="•"/>
             </a:pPr>
             <a:r>
-              <a:rPr lang="en-US" sz="900" dirty="0"/>
-              <a:t>e</a:t>
-            </a:r>
-            <a:r>
-              <a:rPr lang="es-ES_tradnl" sz="900" dirty="0" err="1" smtClean="0">
+              <a:rPr lang="es-ES_tradnl" sz="900" dirty="0" smtClean="0">
                 <a:effectLst/>
               </a:rPr>
-              <a:t>stímulos</a:t>
+              <a:t>estímulos</a:t>
             </a:r>
             <a:endParaRPr lang="is-IS" sz="900" dirty="0" smtClean="0">
               <a:effectLst/>
@@ -8365,7 +8397,7 @@
           <a:effectLst/>
           <a:extLst>
             <a:ext uri="{91240B29-F687-4f45-9708-019B960494DF}">
-              <a14:hiddenLine xmlns:a14="http://schemas.microsoft.com/office/drawing/2010/main" xmlns="" w="9525">
+              <a14:hiddenLine xmlns="" xmlns:a14="http://schemas.microsoft.com/office/drawing/2010/main" w="9525">
                 <a:solidFill>
                   <a:srgbClr val="000000"/>
                 </a:solidFill>
@@ -8375,7 +8407,7 @@
               </a14:hiddenLine>
             </a:ext>
             <a:ext uri="{AF507438-7753-43e0-B8FC-AC1667EBCBE1}">
-              <a14:hiddenEffects xmlns:a14="http://schemas.microsoft.com/office/drawing/2010/main" xmlns="">
+              <a14:hiddenEffects xmlns="" xmlns:a14="http://schemas.microsoft.com/office/drawing/2010/main">
                 <a:effectLst>
                   <a:outerShdw blurRad="63500" dist="38099" dir="2700000" algn="ctr" rotWithShape="0">
                     <a:srgbClr val="000000">
@@ -8658,8 +8690,16 @@
               <a:buNone/>
             </a:pPr>
             <a:r>
+              <a:rPr lang="es-ES" sz="900" dirty="0"/>
+              <a:t>q</a:t>
+            </a:r>
+            <a:r>
               <a:rPr lang="es-ES" sz="900" dirty="0" smtClean="0"/>
-              <a:t>consta de</a:t>
+              <a:t>ue consta </a:t>
+            </a:r>
+            <a:r>
+              <a:rPr lang="es-ES" sz="900" dirty="0" smtClean="0"/>
+              <a:t>de</a:t>
             </a:r>
             <a:endParaRPr lang="es-ES" sz="900" dirty="0"/>
           </a:p>
@@ -9145,7 +9185,7 @@
           <a:effectLst/>
           <a:extLst>
             <a:ext uri="{AF507438-7753-43e0-B8FC-AC1667EBCBE1}">
-              <a14:hiddenEffects xmlns:a14="http://schemas.microsoft.com/office/drawing/2010/main" xmlns="">
+              <a14:hiddenEffects xmlns="" xmlns:a14="http://schemas.microsoft.com/office/drawing/2010/main">
                 <a:effectLst>
                   <a:outerShdw blurRad="63500" dist="38099" dir="2700000" algn="ctr" rotWithShape="0">
                     <a:srgbClr val="000000">
@@ -9519,7 +9559,7 @@
           <a:effectLst/>
           <a:extLst>
             <a:ext uri="{91240B29-F687-4f45-9708-019B960494DF}">
-              <a14:hiddenLine xmlns:a14="http://schemas.microsoft.com/office/drawing/2010/main" xmlns="" w="9525">
+              <a14:hiddenLine xmlns="" xmlns:a14="http://schemas.microsoft.com/office/drawing/2010/main" w="9525">
                 <a:solidFill>
                   <a:srgbClr val="000000"/>
                 </a:solidFill>
@@ -9529,7 +9569,7 @@
               </a14:hiddenLine>
             </a:ext>
             <a:ext uri="{AF507438-7753-43e0-B8FC-AC1667EBCBE1}">
-              <a14:hiddenEffects xmlns:a14="http://schemas.microsoft.com/office/drawing/2010/main" xmlns="">
+              <a14:hiddenEffects xmlns="" xmlns:a14="http://schemas.microsoft.com/office/drawing/2010/main">
                 <a:effectLst>
                   <a:outerShdw blurRad="63500" dist="38099" dir="2700000" algn="ctr" rotWithShape="0">
                     <a:srgbClr val="000000">
@@ -10334,7 +10374,7 @@
         </p:nvSpPr>
         <p:spPr bwMode="auto">
           <a:xfrm>
-            <a:off x="8113579" y="2735913"/>
+            <a:off x="8093959" y="2954325"/>
             <a:ext cx="792162" cy="431800"/>
           </a:xfrm>
           <a:prstGeom prst="rect">
@@ -10354,7 +10394,7 @@
           <a:effectLst/>
           <a:extLst>
             <a:ext uri="{AF507438-7753-43e0-B8FC-AC1667EBCBE1}">
-              <a14:hiddenEffects xmlns:a14="http://schemas.microsoft.com/office/drawing/2010/main" xmlns="">
+              <a14:hiddenEffects xmlns="" xmlns:a14="http://schemas.microsoft.com/office/drawing/2010/main">
                 <a:effectLst>
                   <a:outerShdw blurRad="63500" dist="38099" dir="2700000" algn="ctr" rotWithShape="0">
                     <a:srgbClr val="000000">
@@ -10670,7 +10710,7 @@
         </p:nvSpPr>
         <p:spPr bwMode="auto">
           <a:xfrm>
-            <a:off x="6680200" y="2737824"/>
+            <a:off x="6900673" y="2944801"/>
             <a:ext cx="912714" cy="431800"/>
           </a:xfrm>
           <a:prstGeom prst="rect">
@@ -10690,7 +10730,7 @@
           <a:effectLst/>
           <a:extLst>
             <a:ext uri="{AF507438-7753-43e0-B8FC-AC1667EBCBE1}">
-              <a14:hiddenEffects xmlns:a14="http://schemas.microsoft.com/office/drawing/2010/main" xmlns="">
+              <a14:hiddenEffects xmlns="" xmlns:a14="http://schemas.microsoft.com/office/drawing/2010/main">
                 <a:effectLst>
                   <a:outerShdw blurRad="63500" dist="38099" dir="2700000" algn="ctr" rotWithShape="0">
                     <a:srgbClr val="000000">
@@ -11006,7 +11046,7 @@
         </p:nvSpPr>
         <p:spPr bwMode="auto">
           <a:xfrm>
-            <a:off x="5316168" y="2737824"/>
+            <a:off x="5314027" y="2930350"/>
             <a:ext cx="792162" cy="431800"/>
           </a:xfrm>
           <a:prstGeom prst="rect">
@@ -11026,7 +11066,7 @@
           <a:effectLst/>
           <a:extLst>
             <a:ext uri="{AF507438-7753-43e0-B8FC-AC1667EBCBE1}">
-              <a14:hiddenEffects xmlns:a14="http://schemas.microsoft.com/office/drawing/2010/main" xmlns="">
+              <a14:hiddenEffects xmlns="" xmlns:a14="http://schemas.microsoft.com/office/drawing/2010/main">
                 <a:effectLst>
                   <a:outerShdw blurRad="63500" dist="38099" dir="2700000" algn="ctr" rotWithShape="0">
                     <a:srgbClr val="000000">
@@ -11357,7 +11397,7 @@
           <a:effectLst/>
           <a:extLst>
             <a:ext uri="{91240B29-F687-4f45-9708-019B960494DF}">
-              <a14:hiddenLine xmlns:a14="http://schemas.microsoft.com/office/drawing/2010/main" xmlns="" w="9525">
+              <a14:hiddenLine xmlns="" xmlns:a14="http://schemas.microsoft.com/office/drawing/2010/main" w="9525">
                 <a:solidFill>
                   <a:srgbClr val="000000"/>
                 </a:solidFill>
@@ -11367,7 +11407,7 @@
               </a14:hiddenLine>
             </a:ext>
             <a:ext uri="{AF507438-7753-43e0-B8FC-AC1667EBCBE1}">
-              <a14:hiddenEffects xmlns:a14="http://schemas.microsoft.com/office/drawing/2010/main" xmlns="">
+              <a14:hiddenEffects xmlns="" xmlns:a14="http://schemas.microsoft.com/office/drawing/2010/main">
                 <a:effectLst>
                   <a:outerShdw blurRad="63500" dist="38099" dir="2700000" algn="ctr" rotWithShape="0">
                     <a:srgbClr val="000000">
@@ -11650,8 +11690,12 @@
               <a:buNone/>
             </a:pPr>
             <a:r>
+              <a:rPr lang="es-ES" sz="900" dirty="0"/>
+              <a:t>c</a:t>
+            </a:r>
+            <a:r>
               <a:rPr lang="es-ES" sz="900" dirty="0" smtClean="0"/>
-              <a:t>son</a:t>
+              <a:t>uyos organismos son</a:t>
             </a:r>
             <a:endParaRPr lang="es-ES" sz="900" dirty="0"/>
           </a:p>
@@ -11668,7 +11712,7 @@
         <p:spPr bwMode="auto">
           <a:xfrm>
             <a:off x="5103366" y="3882964"/>
-            <a:ext cx="1220903" cy="776593"/>
+            <a:ext cx="1220903" cy="558077"/>
           </a:xfrm>
           <a:prstGeom prst="rect">
             <a:avLst/>
@@ -11687,7 +11731,7 @@
           <a:effectLst/>
           <a:extLst>
             <a:ext uri="{AF507438-7753-43e0-B8FC-AC1667EBCBE1}">
-              <a14:hiddenEffects xmlns:a14="http://schemas.microsoft.com/office/drawing/2010/main" xmlns="">
+              <a14:hiddenEffects xmlns="" xmlns:a14="http://schemas.microsoft.com/office/drawing/2010/main">
                 <a:effectLst>
                   <a:outerShdw blurRad="63500" dist="38099" dir="2700000" algn="ctr" rotWithShape="0">
                     <a:srgbClr val="000000">
@@ -11980,35 +12024,6 @@
             </a:r>
             <a:endParaRPr lang="es-ES" sz="900" dirty="0" smtClean="0"/>
           </a:p>
-          <a:p>
-            <a:pPr marL="171450" indent="-171450">
-              <a:buClrTx/>
-              <a:buFont typeface="Arial"/>
-              <a:buChar char="•"/>
-            </a:pPr>
-            <a:r>
-              <a:rPr lang="es-ES_tradnl" sz="900" dirty="0">
-                <a:solidFill>
-                  <a:srgbClr val="FF0000"/>
-                </a:solidFill>
-              </a:rPr>
-              <a:t>p</a:t>
-            </a:r>
-            <a:r>
-              <a:rPr lang="es-ES_tradnl" sz="900" dirty="0" smtClean="0">
-                <a:solidFill>
-                  <a:srgbClr val="FF0000"/>
-                </a:solidFill>
-                <a:effectLst/>
-              </a:rPr>
-              <a:t>ueden vivir en ambientes extremos </a:t>
-            </a:r>
-            <a:endParaRPr lang="es-ES" sz="900" dirty="0">
-              <a:solidFill>
-                <a:srgbClr val="FF0000"/>
-              </a:solidFill>
-            </a:endParaRPr>
-          </a:p>
         </p:txBody>
       </p:sp>
       <p:cxnSp>
@@ -12021,9 +12036,9 @@
           <p:nvPr/>
         </p:nvCxnSpPr>
         <p:spPr>
-          <a:xfrm flipH="1">
-            <a:off x="5711775" y="3169624"/>
-            <a:ext cx="474" cy="264055"/>
+          <a:xfrm>
+            <a:off x="5710108" y="3362150"/>
+            <a:ext cx="1667" cy="71529"/>
           </a:xfrm>
           <a:prstGeom prst="straightConnector1">
             <a:avLst/>
@@ -12069,331 +12084,6 @@
       </p:cxnSp>
       <p:sp>
         <p:nvSpPr>
-          <p:cNvPr id="255" name="Text Box 11"/>
-          <p:cNvSpPr txBox="1">
-            <a:spLocks noChangeArrowheads="1"/>
-          </p:cNvSpPr>
-          <p:nvPr/>
-        </p:nvSpPr>
-        <p:spPr bwMode="auto">
-          <a:xfrm>
-            <a:off x="7985265" y="3433679"/>
-            <a:ext cx="1052512" cy="194781"/>
-          </a:xfrm>
-          <a:prstGeom prst="rect">
-            <a:avLst/>
-          </a:prstGeom>
-          <a:solidFill>
-            <a:srgbClr val="FFFFFF"/>
-          </a:solidFill>
-          <a:ln>
-            <a:noFill/>
-          </a:ln>
-          <a:effectLst/>
-          <a:extLst>
-            <a:ext uri="{91240B29-F687-4f45-9708-019B960494DF}">
-              <a14:hiddenLine xmlns:a14="http://schemas.microsoft.com/office/drawing/2010/main" xmlns="" w="9525">
-                <a:solidFill>
-                  <a:srgbClr val="000000"/>
-                </a:solidFill>
-                <a:round/>
-                <a:headEnd/>
-                <a:tailEnd/>
-              </a14:hiddenLine>
-            </a:ext>
-            <a:ext uri="{AF507438-7753-43e0-B8FC-AC1667EBCBE1}">
-              <a14:hiddenEffects xmlns:a14="http://schemas.microsoft.com/office/drawing/2010/main" xmlns="">
-                <a:effectLst>
-                  <a:outerShdw blurRad="63500" dist="38099" dir="2700000" algn="ctr" rotWithShape="0">
-                    <a:srgbClr val="000000">
-                      <a:alpha val="74998"/>
-                    </a:srgbClr>
-                  </a:outerShdw>
-                </a:effectLst>
-              </a14:hiddenEffects>
-            </a:ext>
-          </a:extLst>
-        </p:spPr>
-        <p:txBody>
-          <a:bodyPr lIns="18000" tIns="10800" rIns="18000" bIns="10800" anchor="ctr" anchorCtr="1"/>
-          <a:lstStyle>
-            <a:lvl1pPr>
-              <a:tabLst>
-                <a:tab pos="0" algn="l"/>
-                <a:tab pos="914400" algn="l"/>
-                <a:tab pos="1828800" algn="l"/>
-                <a:tab pos="2743200" algn="l"/>
-                <a:tab pos="3657600" algn="l"/>
-                <a:tab pos="4572000" algn="l"/>
-                <a:tab pos="5486400" algn="l"/>
-                <a:tab pos="6400800" algn="l"/>
-                <a:tab pos="7315200" algn="l"/>
-                <a:tab pos="8229600" algn="l"/>
-                <a:tab pos="9144000" algn="l"/>
-                <a:tab pos="10058400" algn="l"/>
-              </a:tabLst>
-              <a:defRPr>
-                <a:solidFill>
-                  <a:srgbClr val="000000"/>
-                </a:solidFill>
-                <a:latin typeface="Arial" charset="0"/>
-                <a:ea typeface="ＭＳ Ｐゴシック" charset="0"/>
-                <a:cs typeface="Arial" charset="0"/>
-              </a:defRPr>
-            </a:lvl1pPr>
-            <a:lvl2pPr>
-              <a:tabLst>
-                <a:tab pos="0" algn="l"/>
-                <a:tab pos="914400" algn="l"/>
-                <a:tab pos="1828800" algn="l"/>
-                <a:tab pos="2743200" algn="l"/>
-                <a:tab pos="3657600" algn="l"/>
-                <a:tab pos="4572000" algn="l"/>
-                <a:tab pos="5486400" algn="l"/>
-                <a:tab pos="6400800" algn="l"/>
-                <a:tab pos="7315200" algn="l"/>
-                <a:tab pos="8229600" algn="l"/>
-                <a:tab pos="9144000" algn="l"/>
-                <a:tab pos="10058400" algn="l"/>
-              </a:tabLst>
-              <a:defRPr>
-                <a:solidFill>
-                  <a:srgbClr val="000000"/>
-                </a:solidFill>
-                <a:latin typeface="Arial" charset="0"/>
-                <a:ea typeface="Arial" charset="0"/>
-                <a:cs typeface="Arial" charset="0"/>
-              </a:defRPr>
-            </a:lvl2pPr>
-            <a:lvl3pPr>
-              <a:tabLst>
-                <a:tab pos="0" algn="l"/>
-                <a:tab pos="914400" algn="l"/>
-                <a:tab pos="1828800" algn="l"/>
-                <a:tab pos="2743200" algn="l"/>
-                <a:tab pos="3657600" algn="l"/>
-                <a:tab pos="4572000" algn="l"/>
-                <a:tab pos="5486400" algn="l"/>
-                <a:tab pos="6400800" algn="l"/>
-                <a:tab pos="7315200" algn="l"/>
-                <a:tab pos="8229600" algn="l"/>
-                <a:tab pos="9144000" algn="l"/>
-                <a:tab pos="10058400" algn="l"/>
-              </a:tabLst>
-              <a:defRPr>
-                <a:solidFill>
-                  <a:srgbClr val="000000"/>
-                </a:solidFill>
-                <a:latin typeface="Arial" charset="0"/>
-                <a:ea typeface="Arial" charset="0"/>
-                <a:cs typeface="Arial" charset="0"/>
-              </a:defRPr>
-            </a:lvl3pPr>
-            <a:lvl4pPr>
-              <a:tabLst>
-                <a:tab pos="0" algn="l"/>
-                <a:tab pos="914400" algn="l"/>
-                <a:tab pos="1828800" algn="l"/>
-                <a:tab pos="2743200" algn="l"/>
-                <a:tab pos="3657600" algn="l"/>
-                <a:tab pos="4572000" algn="l"/>
-                <a:tab pos="5486400" algn="l"/>
-                <a:tab pos="6400800" algn="l"/>
-                <a:tab pos="7315200" algn="l"/>
-                <a:tab pos="8229600" algn="l"/>
-                <a:tab pos="9144000" algn="l"/>
-                <a:tab pos="10058400" algn="l"/>
-              </a:tabLst>
-              <a:defRPr>
-                <a:solidFill>
-                  <a:srgbClr val="000000"/>
-                </a:solidFill>
-                <a:latin typeface="Arial" charset="0"/>
-                <a:ea typeface="Arial" charset="0"/>
-                <a:cs typeface="Arial" charset="0"/>
-              </a:defRPr>
-            </a:lvl4pPr>
-            <a:lvl5pPr>
-              <a:tabLst>
-                <a:tab pos="0" algn="l"/>
-                <a:tab pos="914400" algn="l"/>
-                <a:tab pos="1828800" algn="l"/>
-                <a:tab pos="2743200" algn="l"/>
-                <a:tab pos="3657600" algn="l"/>
-                <a:tab pos="4572000" algn="l"/>
-                <a:tab pos="5486400" algn="l"/>
-                <a:tab pos="6400800" algn="l"/>
-                <a:tab pos="7315200" algn="l"/>
-                <a:tab pos="8229600" algn="l"/>
-                <a:tab pos="9144000" algn="l"/>
-                <a:tab pos="10058400" algn="l"/>
-              </a:tabLst>
-              <a:defRPr>
-                <a:solidFill>
-                  <a:srgbClr val="000000"/>
-                </a:solidFill>
-                <a:latin typeface="Arial" charset="0"/>
-                <a:ea typeface="Arial" charset="0"/>
-                <a:cs typeface="Arial" charset="0"/>
-              </a:defRPr>
-            </a:lvl5pPr>
-            <a:lvl6pPr marL="2514600" indent="-228600" defTabSz="449263" fontAlgn="base">
-              <a:spcBef>
-                <a:spcPct val="0"/>
-              </a:spcBef>
-              <a:spcAft>
-                <a:spcPct val="0"/>
-              </a:spcAft>
-              <a:buClr>
-                <a:srgbClr val="000000"/>
-              </a:buClr>
-              <a:buSzPct val="100000"/>
-              <a:buFont typeface="Times New Roman" charset="0"/>
-              <a:tabLst>
-                <a:tab pos="0" algn="l"/>
-                <a:tab pos="914400" algn="l"/>
-                <a:tab pos="1828800" algn="l"/>
-                <a:tab pos="2743200" algn="l"/>
-                <a:tab pos="3657600" algn="l"/>
-                <a:tab pos="4572000" algn="l"/>
-                <a:tab pos="5486400" algn="l"/>
-                <a:tab pos="6400800" algn="l"/>
-                <a:tab pos="7315200" algn="l"/>
-                <a:tab pos="8229600" algn="l"/>
-                <a:tab pos="9144000" algn="l"/>
-                <a:tab pos="10058400" algn="l"/>
-              </a:tabLst>
-              <a:defRPr>
-                <a:solidFill>
-                  <a:srgbClr val="000000"/>
-                </a:solidFill>
-                <a:latin typeface="Arial" charset="0"/>
-                <a:ea typeface="Arial" charset="0"/>
-                <a:cs typeface="Arial" charset="0"/>
-              </a:defRPr>
-            </a:lvl6pPr>
-            <a:lvl7pPr marL="2971800" indent="-228600" defTabSz="449263" fontAlgn="base">
-              <a:spcBef>
-                <a:spcPct val="0"/>
-              </a:spcBef>
-              <a:spcAft>
-                <a:spcPct val="0"/>
-              </a:spcAft>
-              <a:buClr>
-                <a:srgbClr val="000000"/>
-              </a:buClr>
-              <a:buSzPct val="100000"/>
-              <a:buFont typeface="Times New Roman" charset="0"/>
-              <a:tabLst>
-                <a:tab pos="0" algn="l"/>
-                <a:tab pos="914400" algn="l"/>
-                <a:tab pos="1828800" algn="l"/>
-                <a:tab pos="2743200" algn="l"/>
-                <a:tab pos="3657600" algn="l"/>
-                <a:tab pos="4572000" algn="l"/>
-                <a:tab pos="5486400" algn="l"/>
-                <a:tab pos="6400800" algn="l"/>
-                <a:tab pos="7315200" algn="l"/>
-                <a:tab pos="8229600" algn="l"/>
-                <a:tab pos="9144000" algn="l"/>
-                <a:tab pos="10058400" algn="l"/>
-              </a:tabLst>
-              <a:defRPr>
-                <a:solidFill>
-                  <a:srgbClr val="000000"/>
-                </a:solidFill>
-                <a:latin typeface="Arial" charset="0"/>
-                <a:ea typeface="Arial" charset="0"/>
-                <a:cs typeface="Arial" charset="0"/>
-              </a:defRPr>
-            </a:lvl7pPr>
-            <a:lvl8pPr marL="3429000" indent="-228600" defTabSz="449263" fontAlgn="base">
-              <a:spcBef>
-                <a:spcPct val="0"/>
-              </a:spcBef>
-              <a:spcAft>
-                <a:spcPct val="0"/>
-              </a:spcAft>
-              <a:buClr>
-                <a:srgbClr val="000000"/>
-              </a:buClr>
-              <a:buSzPct val="100000"/>
-              <a:buFont typeface="Times New Roman" charset="0"/>
-              <a:tabLst>
-                <a:tab pos="0" algn="l"/>
-                <a:tab pos="914400" algn="l"/>
-                <a:tab pos="1828800" algn="l"/>
-                <a:tab pos="2743200" algn="l"/>
-                <a:tab pos="3657600" algn="l"/>
-                <a:tab pos="4572000" algn="l"/>
-                <a:tab pos="5486400" algn="l"/>
-                <a:tab pos="6400800" algn="l"/>
-                <a:tab pos="7315200" algn="l"/>
-                <a:tab pos="8229600" algn="l"/>
-                <a:tab pos="9144000" algn="l"/>
-                <a:tab pos="10058400" algn="l"/>
-              </a:tabLst>
-              <a:defRPr>
-                <a:solidFill>
-                  <a:srgbClr val="000000"/>
-                </a:solidFill>
-                <a:latin typeface="Arial" charset="0"/>
-                <a:ea typeface="Arial" charset="0"/>
-                <a:cs typeface="Arial" charset="0"/>
-              </a:defRPr>
-            </a:lvl8pPr>
-            <a:lvl9pPr marL="3886200" indent="-228600" defTabSz="449263" fontAlgn="base">
-              <a:spcBef>
-                <a:spcPct val="0"/>
-              </a:spcBef>
-              <a:spcAft>
-                <a:spcPct val="0"/>
-              </a:spcAft>
-              <a:buClr>
-                <a:srgbClr val="000000"/>
-              </a:buClr>
-              <a:buSzPct val="100000"/>
-              <a:buFont typeface="Times New Roman" charset="0"/>
-              <a:tabLst>
-                <a:tab pos="0" algn="l"/>
-                <a:tab pos="914400" algn="l"/>
-                <a:tab pos="1828800" algn="l"/>
-                <a:tab pos="2743200" algn="l"/>
-                <a:tab pos="3657600" algn="l"/>
-                <a:tab pos="4572000" algn="l"/>
-                <a:tab pos="5486400" algn="l"/>
-                <a:tab pos="6400800" algn="l"/>
-                <a:tab pos="7315200" algn="l"/>
-                <a:tab pos="8229600" algn="l"/>
-                <a:tab pos="9144000" algn="l"/>
-                <a:tab pos="10058400" algn="l"/>
-              </a:tabLst>
-              <a:defRPr>
-                <a:solidFill>
-                  <a:srgbClr val="000000"/>
-                </a:solidFill>
-                <a:latin typeface="Arial" charset="0"/>
-                <a:ea typeface="Arial" charset="0"/>
-                <a:cs typeface="Arial" charset="0"/>
-              </a:defRPr>
-            </a:lvl9pPr>
-          </a:lstStyle>
-          <a:p>
-            <a:pPr algn="ctr">
-              <a:buClrTx/>
-              <a:buFontTx/>
-              <a:buNone/>
-            </a:pPr>
-            <a:r>
-              <a:rPr lang="es-ES" sz="900" dirty="0" smtClean="0"/>
-              <a:t>son</a:t>
-            </a:r>
-            <a:endParaRPr lang="es-ES" sz="900" dirty="0"/>
-          </a:p>
-        </p:txBody>
-      </p:sp>
-      <p:sp>
-        <p:nvSpPr>
           <p:cNvPr id="257" name="Text Box 19"/>
           <p:cNvSpPr txBox="1">
             <a:spLocks noChangeArrowheads="1"/>
@@ -12402,8 +12092,8 @@
         </p:nvSpPr>
         <p:spPr bwMode="auto">
           <a:xfrm>
-            <a:off x="8009479" y="3910373"/>
-            <a:ext cx="1008393" cy="707593"/>
+            <a:off x="8009479" y="3910374"/>
+            <a:ext cx="1008393" cy="530668"/>
           </a:xfrm>
           <a:prstGeom prst="rect">
             <a:avLst/>
@@ -12422,7 +12112,7 @@
           <a:effectLst/>
           <a:extLst>
             <a:ext uri="{AF507438-7753-43e0-B8FC-AC1667EBCBE1}">
-              <a14:hiddenEffects xmlns:a14="http://schemas.microsoft.com/office/drawing/2010/main" xmlns="">
+              <a14:hiddenEffects xmlns="" xmlns:a14="http://schemas.microsoft.com/office/drawing/2010/main">
                 <a:effectLst>
                   <a:outerShdw blurRad="63500" dist="38099" dir="2700000" algn="ctr" rotWithShape="0">
                     <a:srgbClr val="000000">
@@ -12716,37 +12406,9 @@
             <a:endParaRPr lang="es-ES" sz="900" dirty="0" smtClean="0"/>
           </a:p>
           <a:p>
-            <a:pPr marL="171450" indent="-171450">
+            <a:pPr>
               <a:buClrTx/>
-              <a:buFont typeface="Arial"/>
-              <a:buChar char="•"/>
             </a:pPr>
-            <a:r>
-              <a:rPr lang="pt-BR" sz="900" dirty="0" err="1">
-                <a:solidFill>
-                  <a:srgbClr val="FF0000"/>
-                </a:solidFill>
-              </a:rPr>
-              <a:t>c</a:t>
-            </a:r>
-            <a:r>
-              <a:rPr lang="pt-BR" sz="900" dirty="0" err="1" smtClean="0">
-                <a:solidFill>
-                  <a:srgbClr val="FF0000"/>
-                </a:solidFill>
-                <a:effectLst/>
-              </a:rPr>
-              <a:t>osmopólitas</a:t>
-            </a:r>
-            <a:r>
-              <a:rPr lang="pt-BR" sz="900" dirty="0" smtClean="0">
-                <a:solidFill>
-                  <a:srgbClr val="FF0000"/>
-                </a:solidFill>
-                <a:effectLst/>
-              </a:rPr>
-              <a:t> </a:t>
-            </a:r>
             <a:endParaRPr lang="es-ES" sz="900" dirty="0">
               <a:solidFill>
                 <a:srgbClr val="FF0000"/>
@@ -12760,14 +12422,13 @@
           <p:cNvPr id="258" name="Conector angular 30"/>
           <p:cNvCxnSpPr>
             <a:stCxn id="248" idx="2"/>
-            <a:endCxn id="255" idx="0"/>
           </p:cNvCxnSpPr>
           <p:nvPr/>
         </p:nvCxnSpPr>
         <p:spPr>
           <a:xfrm>
-            <a:off x="8509660" y="3167713"/>
-            <a:ext cx="1861" cy="265966"/>
+            <a:off x="8490040" y="3386125"/>
+            <a:ext cx="21481" cy="47554"/>
           </a:xfrm>
           <a:prstGeom prst="straightConnector1">
             <a:avLst/>
@@ -12787,7 +12448,6 @@
         <p:nvCxnSpPr>
           <p:cNvPr id="259" name="Conector angular 30"/>
           <p:cNvCxnSpPr>
-            <a:stCxn id="255" idx="2"/>
             <a:endCxn id="257" idx="0"/>
           </p:cNvCxnSpPr>
           <p:nvPr/>
@@ -12795,7 +12455,7 @@
         <p:spPr>
           <a:xfrm>
             <a:off x="8511521" y="3628460"/>
-            <a:ext cx="2155" cy="281913"/>
+            <a:ext cx="2155" cy="281914"/>
           </a:xfrm>
           <a:prstGeom prst="straightConnector1">
             <a:avLst/>
@@ -12811,331 +12471,6 @@
           <a:effectLst/>
         </p:spPr>
       </p:cxnSp>
-      <p:sp>
-        <p:nvSpPr>
-          <p:cNvPr id="260" name="Text Box 11"/>
-          <p:cNvSpPr txBox="1">
-            <a:spLocks noChangeArrowheads="1"/>
-          </p:cNvSpPr>
-          <p:nvPr/>
-        </p:nvSpPr>
-        <p:spPr bwMode="auto">
-          <a:xfrm>
-            <a:off x="5538702" y="4778109"/>
-            <a:ext cx="1052512" cy="194781"/>
-          </a:xfrm>
-          <a:prstGeom prst="rect">
-            <a:avLst/>
-          </a:prstGeom>
-          <a:solidFill>
-            <a:srgbClr val="FFFFFF"/>
-          </a:solidFill>
-          <a:ln>
-            <a:noFill/>
-          </a:ln>
-          <a:effectLst/>
-          <a:extLst>
-            <a:ext uri="{91240B29-F687-4f45-9708-019B960494DF}">
-              <a14:hiddenLine xmlns:a14="http://schemas.microsoft.com/office/drawing/2010/main" xmlns="" w="9525">
-                <a:solidFill>
-                  <a:srgbClr val="000000"/>
-                </a:solidFill>
-                <a:round/>
-                <a:headEnd/>
-                <a:tailEnd/>
-              </a14:hiddenLine>
-            </a:ext>
-            <a:ext uri="{AF507438-7753-43e0-B8FC-AC1667EBCBE1}">
-              <a14:hiddenEffects xmlns:a14="http://schemas.microsoft.com/office/drawing/2010/main" xmlns="">
-                <a:effectLst>
-                  <a:outerShdw blurRad="63500" dist="38099" dir="2700000" algn="ctr" rotWithShape="0">
-                    <a:srgbClr val="000000">
-                      <a:alpha val="74998"/>
-                    </a:srgbClr>
-                  </a:outerShdw>
-                </a:effectLst>
-              </a14:hiddenEffects>
-            </a:ext>
-          </a:extLst>
-        </p:spPr>
-        <p:txBody>
-          <a:bodyPr lIns="18000" tIns="10800" rIns="18000" bIns="10800" anchor="ctr" anchorCtr="1"/>
-          <a:lstStyle>
-            <a:lvl1pPr>
-              <a:tabLst>
-                <a:tab pos="0" algn="l"/>
-                <a:tab pos="914400" algn="l"/>
-                <a:tab pos="1828800" algn="l"/>
-                <a:tab pos="2743200" algn="l"/>
-                <a:tab pos="3657600" algn="l"/>
-                <a:tab pos="4572000" algn="l"/>
-                <a:tab pos="5486400" algn="l"/>
-                <a:tab pos="6400800" algn="l"/>
-                <a:tab pos="7315200" algn="l"/>
-                <a:tab pos="8229600" algn="l"/>
-                <a:tab pos="9144000" algn="l"/>
-                <a:tab pos="10058400" algn="l"/>
-              </a:tabLst>
-              <a:defRPr>
-                <a:solidFill>
-                  <a:srgbClr val="000000"/>
-                </a:solidFill>
-                <a:latin typeface="Arial" charset="0"/>
-                <a:ea typeface="ＭＳ Ｐゴシック" charset="0"/>
-                <a:cs typeface="Arial" charset="0"/>
-              </a:defRPr>
-            </a:lvl1pPr>
-            <a:lvl2pPr>
-              <a:tabLst>
-                <a:tab pos="0" algn="l"/>
-                <a:tab pos="914400" algn="l"/>
-                <a:tab pos="1828800" algn="l"/>
-                <a:tab pos="2743200" algn="l"/>
-                <a:tab pos="3657600" algn="l"/>
-                <a:tab pos="4572000" algn="l"/>
-                <a:tab pos="5486400" algn="l"/>
-                <a:tab pos="6400800" algn="l"/>
-                <a:tab pos="7315200" algn="l"/>
-                <a:tab pos="8229600" algn="l"/>
-                <a:tab pos="9144000" algn="l"/>
-                <a:tab pos="10058400" algn="l"/>
-              </a:tabLst>
-              <a:defRPr>
-                <a:solidFill>
-                  <a:srgbClr val="000000"/>
-                </a:solidFill>
-                <a:latin typeface="Arial" charset="0"/>
-                <a:ea typeface="Arial" charset="0"/>
-                <a:cs typeface="Arial" charset="0"/>
-              </a:defRPr>
-            </a:lvl2pPr>
-            <a:lvl3pPr>
-              <a:tabLst>
-                <a:tab pos="0" algn="l"/>
-                <a:tab pos="914400" algn="l"/>
-                <a:tab pos="1828800" algn="l"/>
-                <a:tab pos="2743200" algn="l"/>
-                <a:tab pos="3657600" algn="l"/>
-                <a:tab pos="4572000" algn="l"/>
-                <a:tab pos="5486400" algn="l"/>
-                <a:tab pos="6400800" algn="l"/>
-                <a:tab pos="7315200" algn="l"/>
-                <a:tab pos="8229600" algn="l"/>
-                <a:tab pos="9144000" algn="l"/>
-                <a:tab pos="10058400" algn="l"/>
-              </a:tabLst>
-              <a:defRPr>
-                <a:solidFill>
-                  <a:srgbClr val="000000"/>
-                </a:solidFill>
-                <a:latin typeface="Arial" charset="0"/>
-                <a:ea typeface="Arial" charset="0"/>
-                <a:cs typeface="Arial" charset="0"/>
-              </a:defRPr>
-            </a:lvl3pPr>
-            <a:lvl4pPr>
-              <a:tabLst>
-                <a:tab pos="0" algn="l"/>
-                <a:tab pos="914400" algn="l"/>
-                <a:tab pos="1828800" algn="l"/>
-                <a:tab pos="2743200" algn="l"/>
-                <a:tab pos="3657600" algn="l"/>
-                <a:tab pos="4572000" algn="l"/>
-                <a:tab pos="5486400" algn="l"/>
-                <a:tab pos="6400800" algn="l"/>
-                <a:tab pos="7315200" algn="l"/>
-                <a:tab pos="8229600" algn="l"/>
-                <a:tab pos="9144000" algn="l"/>
-                <a:tab pos="10058400" algn="l"/>
-              </a:tabLst>
-              <a:defRPr>
-                <a:solidFill>
-                  <a:srgbClr val="000000"/>
-                </a:solidFill>
-                <a:latin typeface="Arial" charset="0"/>
-                <a:ea typeface="Arial" charset="0"/>
-                <a:cs typeface="Arial" charset="0"/>
-              </a:defRPr>
-            </a:lvl4pPr>
-            <a:lvl5pPr>
-              <a:tabLst>
-                <a:tab pos="0" algn="l"/>
-                <a:tab pos="914400" algn="l"/>
-                <a:tab pos="1828800" algn="l"/>
-                <a:tab pos="2743200" algn="l"/>
-                <a:tab pos="3657600" algn="l"/>
-                <a:tab pos="4572000" algn="l"/>
-                <a:tab pos="5486400" algn="l"/>
-                <a:tab pos="6400800" algn="l"/>
-                <a:tab pos="7315200" algn="l"/>
-                <a:tab pos="8229600" algn="l"/>
-                <a:tab pos="9144000" algn="l"/>
-                <a:tab pos="10058400" algn="l"/>
-              </a:tabLst>
-              <a:defRPr>
-                <a:solidFill>
-                  <a:srgbClr val="000000"/>
-                </a:solidFill>
-                <a:latin typeface="Arial" charset="0"/>
-                <a:ea typeface="Arial" charset="0"/>
-                <a:cs typeface="Arial" charset="0"/>
-              </a:defRPr>
-            </a:lvl5pPr>
-            <a:lvl6pPr marL="2514600" indent="-228600" defTabSz="449263" fontAlgn="base">
-              <a:spcBef>
-                <a:spcPct val="0"/>
-              </a:spcBef>
-              <a:spcAft>
-                <a:spcPct val="0"/>
-              </a:spcAft>
-              <a:buClr>
-                <a:srgbClr val="000000"/>
-              </a:buClr>
-              <a:buSzPct val="100000"/>
-              <a:buFont typeface="Times New Roman" charset="0"/>
-              <a:tabLst>
-                <a:tab pos="0" algn="l"/>
-                <a:tab pos="914400" algn="l"/>
-                <a:tab pos="1828800" algn="l"/>
-                <a:tab pos="2743200" algn="l"/>
-                <a:tab pos="3657600" algn="l"/>
-                <a:tab pos="4572000" algn="l"/>
-                <a:tab pos="5486400" algn="l"/>
-                <a:tab pos="6400800" algn="l"/>
-                <a:tab pos="7315200" algn="l"/>
-                <a:tab pos="8229600" algn="l"/>
-                <a:tab pos="9144000" algn="l"/>
-                <a:tab pos="10058400" algn="l"/>
-              </a:tabLst>
-              <a:defRPr>
-                <a:solidFill>
-                  <a:srgbClr val="000000"/>
-                </a:solidFill>
-                <a:latin typeface="Arial" charset="0"/>
-                <a:ea typeface="Arial" charset="0"/>
-                <a:cs typeface="Arial" charset="0"/>
-              </a:defRPr>
-            </a:lvl6pPr>
-            <a:lvl7pPr marL="2971800" indent="-228600" defTabSz="449263" fontAlgn="base">
-              <a:spcBef>
-                <a:spcPct val="0"/>
-              </a:spcBef>
-              <a:spcAft>
-                <a:spcPct val="0"/>
-              </a:spcAft>
-              <a:buClr>
-                <a:srgbClr val="000000"/>
-              </a:buClr>
-              <a:buSzPct val="100000"/>
-              <a:buFont typeface="Times New Roman" charset="0"/>
-              <a:tabLst>
-                <a:tab pos="0" algn="l"/>
-                <a:tab pos="914400" algn="l"/>
-                <a:tab pos="1828800" algn="l"/>
-                <a:tab pos="2743200" algn="l"/>
-                <a:tab pos="3657600" algn="l"/>
-                <a:tab pos="4572000" algn="l"/>
-                <a:tab pos="5486400" algn="l"/>
-                <a:tab pos="6400800" algn="l"/>
-                <a:tab pos="7315200" algn="l"/>
-                <a:tab pos="8229600" algn="l"/>
-                <a:tab pos="9144000" algn="l"/>
-                <a:tab pos="10058400" algn="l"/>
-              </a:tabLst>
-              <a:defRPr>
-                <a:solidFill>
-                  <a:srgbClr val="000000"/>
-                </a:solidFill>
-                <a:latin typeface="Arial" charset="0"/>
-                <a:ea typeface="Arial" charset="0"/>
-                <a:cs typeface="Arial" charset="0"/>
-              </a:defRPr>
-            </a:lvl7pPr>
-            <a:lvl8pPr marL="3429000" indent="-228600" defTabSz="449263" fontAlgn="base">
-              <a:spcBef>
-                <a:spcPct val="0"/>
-              </a:spcBef>
-              <a:spcAft>
-                <a:spcPct val="0"/>
-              </a:spcAft>
-              <a:buClr>
-                <a:srgbClr val="000000"/>
-              </a:buClr>
-              <a:buSzPct val="100000"/>
-              <a:buFont typeface="Times New Roman" charset="0"/>
-              <a:tabLst>
-                <a:tab pos="0" algn="l"/>
-                <a:tab pos="914400" algn="l"/>
-                <a:tab pos="1828800" algn="l"/>
-                <a:tab pos="2743200" algn="l"/>
-                <a:tab pos="3657600" algn="l"/>
-                <a:tab pos="4572000" algn="l"/>
-                <a:tab pos="5486400" algn="l"/>
-                <a:tab pos="6400800" algn="l"/>
-                <a:tab pos="7315200" algn="l"/>
-                <a:tab pos="8229600" algn="l"/>
-                <a:tab pos="9144000" algn="l"/>
-                <a:tab pos="10058400" algn="l"/>
-              </a:tabLst>
-              <a:defRPr>
-                <a:solidFill>
-                  <a:srgbClr val="000000"/>
-                </a:solidFill>
-                <a:latin typeface="Arial" charset="0"/>
-                <a:ea typeface="Arial" charset="0"/>
-                <a:cs typeface="Arial" charset="0"/>
-              </a:defRPr>
-            </a:lvl8pPr>
-            <a:lvl9pPr marL="3886200" indent="-228600" defTabSz="449263" fontAlgn="base">
-              <a:spcBef>
-                <a:spcPct val="0"/>
-              </a:spcBef>
-              <a:spcAft>
-                <a:spcPct val="0"/>
-              </a:spcAft>
-              <a:buClr>
-                <a:srgbClr val="000000"/>
-              </a:buClr>
-              <a:buSzPct val="100000"/>
-              <a:buFont typeface="Times New Roman" charset="0"/>
-              <a:tabLst>
-                <a:tab pos="0" algn="l"/>
-                <a:tab pos="914400" algn="l"/>
-                <a:tab pos="1828800" algn="l"/>
-                <a:tab pos="2743200" algn="l"/>
-                <a:tab pos="3657600" algn="l"/>
-                <a:tab pos="4572000" algn="l"/>
-                <a:tab pos="5486400" algn="l"/>
-                <a:tab pos="6400800" algn="l"/>
-                <a:tab pos="7315200" algn="l"/>
-                <a:tab pos="8229600" algn="l"/>
-                <a:tab pos="9144000" algn="l"/>
-                <a:tab pos="10058400" algn="l"/>
-              </a:tabLst>
-              <a:defRPr>
-                <a:solidFill>
-                  <a:srgbClr val="000000"/>
-                </a:solidFill>
-                <a:latin typeface="Arial" charset="0"/>
-                <a:ea typeface="Arial" charset="0"/>
-                <a:cs typeface="Arial" charset="0"/>
-              </a:defRPr>
-            </a:lvl9pPr>
-          </a:lstStyle>
-          <a:p>
-            <a:pPr algn="ctr">
-              <a:buClrTx/>
-              <a:buFontTx/>
-              <a:buNone/>
-            </a:pPr>
-            <a:r>
-              <a:rPr lang="es-ES" sz="900" dirty="0" smtClean="0"/>
-              <a:t>son</a:t>
-            </a:r>
-            <a:endParaRPr lang="es-ES" sz="900" dirty="0"/>
-          </a:p>
-        </p:txBody>
-      </p:sp>
       <p:sp>
         <p:nvSpPr>
           <p:cNvPr id="261" name="Text Box 19"/>
@@ -13166,7 +12501,7 @@
           <a:effectLst/>
           <a:extLst>
             <a:ext uri="{AF507438-7753-43e0-B8FC-AC1667EBCBE1}">
-              <a14:hiddenEffects xmlns:a14="http://schemas.microsoft.com/office/drawing/2010/main" xmlns="">
+              <a14:hiddenEffects xmlns="" xmlns:a14="http://schemas.microsoft.com/office/drawing/2010/main">
                 <a:effectLst>
                   <a:outerShdw blurRad="63500" dist="38099" dir="2700000" algn="ctr" rotWithShape="0">
                     <a:srgbClr val="000000">
@@ -13459,27 +12794,6 @@
             </a:r>
           </a:p>
           <a:p>
-            <a:pPr marL="171450" indent="-171450">
-              <a:buFont typeface="Arial"/>
-              <a:buChar char="•"/>
-            </a:pPr>
-            <a:r>
-              <a:rPr lang="pt-BR" sz="900" dirty="0" err="1">
-                <a:solidFill>
-                  <a:srgbClr val="FF0000"/>
-                </a:solidFill>
-              </a:rPr>
-              <a:t>c</a:t>
-            </a:r>
-            <a:r>
-              <a:rPr lang="pt-BR" sz="900" dirty="0" err="1" smtClean="0">
-                <a:solidFill>
-                  <a:srgbClr val="FF0000"/>
-                </a:solidFill>
-                <a:effectLst/>
-              </a:rPr>
-              <a:t>osmopólitas</a:t>
-            </a:r>
             <a:r>
               <a:rPr lang="pt-BR" sz="900" dirty="0" smtClean="0">
                 <a:solidFill>
@@ -13502,18 +12816,17 @@
           <p:cNvPr id="262" name="Conector angular 30"/>
           <p:cNvCxnSpPr>
             <a:stCxn id="249" idx="2"/>
-            <a:endCxn id="260" idx="0"/>
           </p:cNvCxnSpPr>
           <p:nvPr/>
         </p:nvCxnSpPr>
         <p:spPr>
           <a:xfrm rot="5400000">
-            <a:off x="5796516" y="3438067"/>
-            <a:ext cx="1608485" cy="1071599"/>
+            <a:off x="6010240" y="3431319"/>
+            <a:ext cx="1401508" cy="1292072"/>
           </a:xfrm>
           <a:prstGeom prst="bentConnector3">
             <a:avLst>
-              <a:gd name="adj1" fmla="val 94438"/>
+              <a:gd name="adj1" fmla="val 86020"/>
             </a:avLst>
           </a:prstGeom>
           <a:noFill/>
@@ -13531,7 +12844,6 @@
         <p:nvCxnSpPr>
           <p:cNvPr id="263" name="Conector angular 30"/>
           <p:cNvCxnSpPr>
-            <a:stCxn id="260" idx="2"/>
             <a:endCxn id="261" idx="0"/>
           </p:cNvCxnSpPr>
           <p:nvPr/>
@@ -13580,7 +12892,7 @@
           <a:effectLst/>
           <a:extLst>
             <a:ext uri="{91240B29-F687-4f45-9708-019B960494DF}">
-              <a14:hiddenLine xmlns:a14="http://schemas.microsoft.com/office/drawing/2010/main" xmlns="" w="9525">
+              <a14:hiddenLine xmlns="" xmlns:a14="http://schemas.microsoft.com/office/drawing/2010/main" w="9525">
                 <a:solidFill>
                   <a:srgbClr val="000000"/>
                 </a:solidFill>
@@ -13590,7 +12902,7 @@
               </a14:hiddenLine>
             </a:ext>
             <a:ext uri="{AF507438-7753-43e0-B8FC-AC1667EBCBE1}">
-              <a14:hiddenEffects xmlns:a14="http://schemas.microsoft.com/office/drawing/2010/main" xmlns="">
+              <a14:hiddenEffects xmlns="" xmlns:a14="http://schemas.microsoft.com/office/drawing/2010/main">
                 <a:effectLst>
                   <a:outerShdw blurRad="63500" dist="38099" dir="2700000" algn="ctr" rotWithShape="0">
                     <a:srgbClr val="000000">
@@ -13873,8 +13185,27 @@
               <a:buNone/>
             </a:pPr>
             <a:r>
+              <a:rPr lang="es-ES" sz="900" dirty="0"/>
+              <a:t>e</a:t>
+            </a:r>
+            <a:r>
               <a:rPr lang="es-ES" sz="900" dirty="0" smtClean="0"/>
-              <a:t>se dividen en</a:t>
+              <a:t>l cual se </a:t>
+            </a:r>
+          </a:p>
+          <a:p>
+            <a:pPr algn="ctr">
+              <a:buClrTx/>
+              <a:buFontTx/>
+              <a:buNone/>
+            </a:pPr>
+            <a:r>
+              <a:rPr lang="es-ES" sz="900" dirty="0" smtClean="0"/>
+              <a:t>dividen </a:t>
+            </a:r>
+            <a:r>
+              <a:rPr lang="es-ES" sz="900" dirty="0" smtClean="0"/>
+              <a:t>en</a:t>
             </a:r>
             <a:endParaRPr lang="es-ES" sz="900" dirty="0"/>
           </a:p>
@@ -13910,7 +13241,7 @@
           <a:effectLst/>
           <a:extLst>
             <a:ext uri="{AF507438-7753-43e0-B8FC-AC1667EBCBE1}">
-              <a14:hiddenEffects xmlns:a14="http://schemas.microsoft.com/office/drawing/2010/main" xmlns="">
+              <a14:hiddenEffects xmlns="" xmlns:a14="http://schemas.microsoft.com/office/drawing/2010/main">
                 <a:effectLst>
                   <a:outerShdw blurRad="63500" dist="38099" dir="2700000" algn="ctr" rotWithShape="0">
                     <a:srgbClr val="000000">
@@ -14203,15 +13534,13 @@
       <p:cxnSp>
         <p:nvCxnSpPr>
           <p:cNvPr id="266" name="Conector angular 30"/>
-          <p:cNvCxnSpPr>
-            <a:endCxn id="264" idx="0"/>
-          </p:cNvCxnSpPr>
+          <p:cNvCxnSpPr/>
           <p:nvPr/>
         </p:nvCxnSpPr>
         <p:spPr>
           <a:xfrm>
-            <a:off x="7136558" y="4691129"/>
-            <a:ext cx="346665" cy="82710"/>
+            <a:off x="7109367" y="4586238"/>
+            <a:ext cx="373856" cy="197126"/>
           </a:xfrm>
           <a:prstGeom prst="bentConnector2">
             <a:avLst/>
@@ -14265,7 +13594,7 @@
         </p:nvSpPr>
         <p:spPr bwMode="auto">
           <a:xfrm>
-            <a:off x="6913812" y="5846501"/>
+            <a:off x="6913812" y="5951276"/>
             <a:ext cx="1138821" cy="709598"/>
           </a:xfrm>
           <a:prstGeom prst="rect">
@@ -14285,7 +13614,7 @@
           <a:effectLst/>
           <a:extLst>
             <a:ext uri="{AF507438-7753-43e0-B8FC-AC1667EBCBE1}">
-              <a14:hiddenEffects xmlns:a14="http://schemas.microsoft.com/office/drawing/2010/main" xmlns="">
+              <a14:hiddenEffects xmlns="" xmlns:a14="http://schemas.microsoft.com/office/drawing/2010/main">
                 <a:effectLst>
                   <a:outerShdw blurRad="63500" dist="38099" dir="2700000" algn="ctr" rotWithShape="0">
                     <a:srgbClr val="000000">
@@ -14653,7 +13982,7 @@
         <p:spPr>
           <a:xfrm>
             <a:off x="7483223" y="5426720"/>
-            <a:ext cx="0" cy="419781"/>
+            <a:ext cx="0" cy="524556"/>
           </a:xfrm>
           <a:prstGeom prst="straightConnector1">
             <a:avLst/>
@@ -14699,16 +14028,13 @@
       <p:cxnSp>
         <p:nvCxnSpPr>
           <p:cNvPr id="271" name="Conector angular 11"/>
-          <p:cNvCxnSpPr>
-            <a:stCxn id="247" idx="2"/>
-            <a:endCxn id="250" idx="0"/>
-          </p:cNvCxnSpPr>
+          <p:cNvCxnSpPr/>
           <p:nvPr/>
         </p:nvCxnSpPr>
         <p:spPr>
           <a:xfrm rot="5400000">
-            <a:off x="6330393" y="1555563"/>
-            <a:ext cx="564118" cy="1800405"/>
+            <a:off x="6390254" y="1803109"/>
+            <a:ext cx="422511" cy="1849315"/>
           </a:xfrm>
           <a:prstGeom prst="bentConnector3">
             <a:avLst>
@@ -14729,15 +14055,13 @@
       <p:cxnSp>
         <p:nvCxnSpPr>
           <p:cNvPr id="272" name="Conector angular 11"/>
-          <p:cNvCxnSpPr>
-            <a:stCxn id="248" idx="0"/>
-          </p:cNvCxnSpPr>
+          <p:cNvCxnSpPr/>
           <p:nvPr/>
         </p:nvCxnSpPr>
         <p:spPr>
           <a:xfrm rot="16200000" flipV="1">
-            <a:off x="7854982" y="2081234"/>
-            <a:ext cx="282921" cy="1026437"/>
+            <a:off x="7896929" y="2351689"/>
+            <a:ext cx="221699" cy="964524"/>
           </a:xfrm>
           <a:prstGeom prst="bentConnector2">
             <a:avLst/>
@@ -14761,8 +14085,8 @@
         </p:nvCxnSpPr>
         <p:spPr>
           <a:xfrm>
-            <a:off x="7138419" y="2452992"/>
-            <a:ext cx="0" cy="288841"/>
+            <a:off x="7525516" y="2179373"/>
+            <a:ext cx="0" cy="180000"/>
           </a:xfrm>
           <a:prstGeom prst="straightConnector1">
             <a:avLst/>
@@ -14806,6 +14130,1351 @@
           <a:effectLst/>
         </p:spPr>
       </p:cxnSp>
+      <p:sp>
+        <p:nvSpPr>
+          <p:cNvPr id="82" name="Text Box 11"/>
+          <p:cNvSpPr txBox="1">
+            <a:spLocks noChangeArrowheads="1"/>
+          </p:cNvSpPr>
+          <p:nvPr/>
+        </p:nvSpPr>
+        <p:spPr bwMode="auto">
+          <a:xfrm>
+            <a:off x="7109367" y="2318927"/>
+            <a:ext cx="900112" cy="188912"/>
+          </a:xfrm>
+          <a:prstGeom prst="rect">
+            <a:avLst/>
+          </a:prstGeom>
+          <a:solidFill>
+            <a:srgbClr val="FFFFFF"/>
+          </a:solidFill>
+          <a:ln>
+            <a:noFill/>
+          </a:ln>
+          <a:effectLst/>
+          <a:extLst>
+            <a:ext uri="{91240B29-F687-4f45-9708-019B960494DF}">
+              <a14:hiddenLine xmlns="" xmlns:a14="http://schemas.microsoft.com/office/drawing/2010/main" w="9525">
+                <a:solidFill>
+                  <a:srgbClr val="000000"/>
+                </a:solidFill>
+                <a:round/>
+                <a:headEnd/>
+                <a:tailEnd/>
+              </a14:hiddenLine>
+            </a:ext>
+            <a:ext uri="{AF507438-7753-43e0-B8FC-AC1667EBCBE1}">
+              <a14:hiddenEffects xmlns="" xmlns:a14="http://schemas.microsoft.com/office/drawing/2010/main">
+                <a:effectLst>
+                  <a:outerShdw blurRad="63500" dist="38099" dir="2700000" algn="ctr" rotWithShape="0">
+                    <a:srgbClr val="000000">
+                      <a:alpha val="74998"/>
+                    </a:srgbClr>
+                  </a:outerShdw>
+                </a:effectLst>
+              </a14:hiddenEffects>
+            </a:ext>
+          </a:extLst>
+        </p:spPr>
+        <p:txBody>
+          <a:bodyPr lIns="18000" tIns="10800" rIns="18000" bIns="10800" anchor="ctr" anchorCtr="1"/>
+          <a:lstStyle>
+            <a:lvl1pPr>
+              <a:tabLst>
+                <a:tab pos="0" algn="l"/>
+                <a:tab pos="914400" algn="l"/>
+                <a:tab pos="1828800" algn="l"/>
+                <a:tab pos="2743200" algn="l"/>
+                <a:tab pos="3657600" algn="l"/>
+                <a:tab pos="4572000" algn="l"/>
+                <a:tab pos="5486400" algn="l"/>
+                <a:tab pos="6400800" algn="l"/>
+                <a:tab pos="7315200" algn="l"/>
+                <a:tab pos="8229600" algn="l"/>
+                <a:tab pos="9144000" algn="l"/>
+                <a:tab pos="10058400" algn="l"/>
+              </a:tabLst>
+              <a:defRPr>
+                <a:solidFill>
+                  <a:srgbClr val="000000"/>
+                </a:solidFill>
+                <a:latin typeface="Arial" charset="0"/>
+                <a:ea typeface="ＭＳ Ｐゴシック" charset="0"/>
+                <a:cs typeface="Arial" charset="0"/>
+              </a:defRPr>
+            </a:lvl1pPr>
+            <a:lvl2pPr>
+              <a:tabLst>
+                <a:tab pos="0" algn="l"/>
+                <a:tab pos="914400" algn="l"/>
+                <a:tab pos="1828800" algn="l"/>
+                <a:tab pos="2743200" algn="l"/>
+                <a:tab pos="3657600" algn="l"/>
+                <a:tab pos="4572000" algn="l"/>
+                <a:tab pos="5486400" algn="l"/>
+                <a:tab pos="6400800" algn="l"/>
+                <a:tab pos="7315200" algn="l"/>
+                <a:tab pos="8229600" algn="l"/>
+                <a:tab pos="9144000" algn="l"/>
+                <a:tab pos="10058400" algn="l"/>
+              </a:tabLst>
+              <a:defRPr>
+                <a:solidFill>
+                  <a:srgbClr val="000000"/>
+                </a:solidFill>
+                <a:latin typeface="Arial" charset="0"/>
+                <a:ea typeface="Arial" charset="0"/>
+                <a:cs typeface="Arial" charset="0"/>
+              </a:defRPr>
+            </a:lvl2pPr>
+            <a:lvl3pPr>
+              <a:tabLst>
+                <a:tab pos="0" algn="l"/>
+                <a:tab pos="914400" algn="l"/>
+                <a:tab pos="1828800" algn="l"/>
+                <a:tab pos="2743200" algn="l"/>
+                <a:tab pos="3657600" algn="l"/>
+                <a:tab pos="4572000" algn="l"/>
+                <a:tab pos="5486400" algn="l"/>
+                <a:tab pos="6400800" algn="l"/>
+                <a:tab pos="7315200" algn="l"/>
+                <a:tab pos="8229600" algn="l"/>
+                <a:tab pos="9144000" algn="l"/>
+                <a:tab pos="10058400" algn="l"/>
+              </a:tabLst>
+              <a:defRPr>
+                <a:solidFill>
+                  <a:srgbClr val="000000"/>
+                </a:solidFill>
+                <a:latin typeface="Arial" charset="0"/>
+                <a:ea typeface="Arial" charset="0"/>
+                <a:cs typeface="Arial" charset="0"/>
+              </a:defRPr>
+            </a:lvl3pPr>
+            <a:lvl4pPr>
+              <a:tabLst>
+                <a:tab pos="0" algn="l"/>
+                <a:tab pos="914400" algn="l"/>
+                <a:tab pos="1828800" algn="l"/>
+                <a:tab pos="2743200" algn="l"/>
+                <a:tab pos="3657600" algn="l"/>
+                <a:tab pos="4572000" algn="l"/>
+                <a:tab pos="5486400" algn="l"/>
+                <a:tab pos="6400800" algn="l"/>
+                <a:tab pos="7315200" algn="l"/>
+                <a:tab pos="8229600" algn="l"/>
+                <a:tab pos="9144000" algn="l"/>
+                <a:tab pos="10058400" algn="l"/>
+              </a:tabLst>
+              <a:defRPr>
+                <a:solidFill>
+                  <a:srgbClr val="000000"/>
+                </a:solidFill>
+                <a:latin typeface="Arial" charset="0"/>
+                <a:ea typeface="Arial" charset="0"/>
+                <a:cs typeface="Arial" charset="0"/>
+              </a:defRPr>
+            </a:lvl4pPr>
+            <a:lvl5pPr>
+              <a:tabLst>
+                <a:tab pos="0" algn="l"/>
+                <a:tab pos="914400" algn="l"/>
+                <a:tab pos="1828800" algn="l"/>
+                <a:tab pos="2743200" algn="l"/>
+                <a:tab pos="3657600" algn="l"/>
+                <a:tab pos="4572000" algn="l"/>
+                <a:tab pos="5486400" algn="l"/>
+                <a:tab pos="6400800" algn="l"/>
+                <a:tab pos="7315200" algn="l"/>
+                <a:tab pos="8229600" algn="l"/>
+                <a:tab pos="9144000" algn="l"/>
+                <a:tab pos="10058400" algn="l"/>
+              </a:tabLst>
+              <a:defRPr>
+                <a:solidFill>
+                  <a:srgbClr val="000000"/>
+                </a:solidFill>
+                <a:latin typeface="Arial" charset="0"/>
+                <a:ea typeface="Arial" charset="0"/>
+                <a:cs typeface="Arial" charset="0"/>
+              </a:defRPr>
+            </a:lvl5pPr>
+            <a:lvl6pPr marL="2514600" indent="-228600" defTabSz="449263" fontAlgn="base">
+              <a:spcBef>
+                <a:spcPct val="0"/>
+              </a:spcBef>
+              <a:spcAft>
+                <a:spcPct val="0"/>
+              </a:spcAft>
+              <a:buClr>
+                <a:srgbClr val="000000"/>
+              </a:buClr>
+              <a:buSzPct val="100000"/>
+              <a:buFont typeface="Times New Roman" charset="0"/>
+              <a:tabLst>
+                <a:tab pos="0" algn="l"/>
+                <a:tab pos="914400" algn="l"/>
+                <a:tab pos="1828800" algn="l"/>
+                <a:tab pos="2743200" algn="l"/>
+                <a:tab pos="3657600" algn="l"/>
+                <a:tab pos="4572000" algn="l"/>
+                <a:tab pos="5486400" algn="l"/>
+                <a:tab pos="6400800" algn="l"/>
+                <a:tab pos="7315200" algn="l"/>
+                <a:tab pos="8229600" algn="l"/>
+                <a:tab pos="9144000" algn="l"/>
+                <a:tab pos="10058400" algn="l"/>
+              </a:tabLst>
+              <a:defRPr>
+                <a:solidFill>
+                  <a:srgbClr val="000000"/>
+                </a:solidFill>
+                <a:latin typeface="Arial" charset="0"/>
+                <a:ea typeface="Arial" charset="0"/>
+                <a:cs typeface="Arial" charset="0"/>
+              </a:defRPr>
+            </a:lvl6pPr>
+            <a:lvl7pPr marL="2971800" indent="-228600" defTabSz="449263" fontAlgn="base">
+              <a:spcBef>
+                <a:spcPct val="0"/>
+              </a:spcBef>
+              <a:spcAft>
+                <a:spcPct val="0"/>
+              </a:spcAft>
+              <a:buClr>
+                <a:srgbClr val="000000"/>
+              </a:buClr>
+              <a:buSzPct val="100000"/>
+              <a:buFont typeface="Times New Roman" charset="0"/>
+              <a:tabLst>
+                <a:tab pos="0" algn="l"/>
+                <a:tab pos="914400" algn="l"/>
+                <a:tab pos="1828800" algn="l"/>
+                <a:tab pos="2743200" algn="l"/>
+                <a:tab pos="3657600" algn="l"/>
+                <a:tab pos="4572000" algn="l"/>
+                <a:tab pos="5486400" algn="l"/>
+                <a:tab pos="6400800" algn="l"/>
+                <a:tab pos="7315200" algn="l"/>
+                <a:tab pos="8229600" algn="l"/>
+                <a:tab pos="9144000" algn="l"/>
+                <a:tab pos="10058400" algn="l"/>
+              </a:tabLst>
+              <a:defRPr>
+                <a:solidFill>
+                  <a:srgbClr val="000000"/>
+                </a:solidFill>
+                <a:latin typeface="Arial" charset="0"/>
+                <a:ea typeface="Arial" charset="0"/>
+                <a:cs typeface="Arial" charset="0"/>
+              </a:defRPr>
+            </a:lvl7pPr>
+            <a:lvl8pPr marL="3429000" indent="-228600" defTabSz="449263" fontAlgn="base">
+              <a:spcBef>
+                <a:spcPct val="0"/>
+              </a:spcBef>
+              <a:spcAft>
+                <a:spcPct val="0"/>
+              </a:spcAft>
+              <a:buClr>
+                <a:srgbClr val="000000"/>
+              </a:buClr>
+              <a:buSzPct val="100000"/>
+              <a:buFont typeface="Times New Roman" charset="0"/>
+              <a:tabLst>
+                <a:tab pos="0" algn="l"/>
+                <a:tab pos="914400" algn="l"/>
+                <a:tab pos="1828800" algn="l"/>
+                <a:tab pos="2743200" algn="l"/>
+                <a:tab pos="3657600" algn="l"/>
+                <a:tab pos="4572000" algn="l"/>
+                <a:tab pos="5486400" algn="l"/>
+                <a:tab pos="6400800" algn="l"/>
+                <a:tab pos="7315200" algn="l"/>
+                <a:tab pos="8229600" algn="l"/>
+                <a:tab pos="9144000" algn="l"/>
+                <a:tab pos="10058400" algn="l"/>
+              </a:tabLst>
+              <a:defRPr>
+                <a:solidFill>
+                  <a:srgbClr val="000000"/>
+                </a:solidFill>
+                <a:latin typeface="Arial" charset="0"/>
+                <a:ea typeface="Arial" charset="0"/>
+                <a:cs typeface="Arial" charset="0"/>
+              </a:defRPr>
+            </a:lvl8pPr>
+            <a:lvl9pPr marL="3886200" indent="-228600" defTabSz="449263" fontAlgn="base">
+              <a:spcBef>
+                <a:spcPct val="0"/>
+              </a:spcBef>
+              <a:spcAft>
+                <a:spcPct val="0"/>
+              </a:spcAft>
+              <a:buClr>
+                <a:srgbClr val="000000"/>
+              </a:buClr>
+              <a:buSzPct val="100000"/>
+              <a:buFont typeface="Times New Roman" charset="0"/>
+              <a:tabLst>
+                <a:tab pos="0" algn="l"/>
+                <a:tab pos="914400" algn="l"/>
+                <a:tab pos="1828800" algn="l"/>
+                <a:tab pos="2743200" algn="l"/>
+                <a:tab pos="3657600" algn="l"/>
+                <a:tab pos="4572000" algn="l"/>
+                <a:tab pos="5486400" algn="l"/>
+                <a:tab pos="6400800" algn="l"/>
+                <a:tab pos="7315200" algn="l"/>
+                <a:tab pos="8229600" algn="l"/>
+                <a:tab pos="9144000" algn="l"/>
+                <a:tab pos="10058400" algn="l"/>
+              </a:tabLst>
+              <a:defRPr>
+                <a:solidFill>
+                  <a:srgbClr val="000000"/>
+                </a:solidFill>
+                <a:latin typeface="Arial" charset="0"/>
+                <a:ea typeface="Arial" charset="0"/>
+                <a:cs typeface="Arial" charset="0"/>
+              </a:defRPr>
+            </a:lvl9pPr>
+          </a:lstStyle>
+          <a:p>
+            <a:pPr algn="ctr">
+              <a:buClrTx/>
+              <a:buFontTx/>
+              <a:buNone/>
+            </a:pPr>
+            <a:r>
+              <a:rPr lang="es-ES" sz="900" dirty="0"/>
+              <a:t>l</a:t>
+            </a:r>
+            <a:r>
+              <a:rPr lang="es-ES" sz="900" dirty="0" smtClean="0"/>
+              <a:t>os cuales son</a:t>
+            </a:r>
+            <a:endParaRPr lang="es-ES" sz="900" dirty="0"/>
+          </a:p>
+        </p:txBody>
+      </p:sp>
+      <p:cxnSp>
+        <p:nvCxnSpPr>
+          <p:cNvPr id="89" name="Conector angular 30"/>
+          <p:cNvCxnSpPr/>
+          <p:nvPr/>
+        </p:nvCxnSpPr>
+        <p:spPr>
+          <a:xfrm>
+            <a:off x="7525516" y="2723101"/>
+            <a:ext cx="0" cy="198247"/>
+          </a:xfrm>
+          <a:prstGeom prst="straightConnector1">
+            <a:avLst/>
+          </a:prstGeom>
+          <a:noFill/>
+          <a:ln w="12700" cap="flat" cmpd="sng" algn="ctr">
+            <a:solidFill>
+              <a:sysClr val="windowText" lastClr="000000"/>
+            </a:solidFill>
+            <a:prstDash val="solid"/>
+            <a:miter lim="800000"/>
+          </a:ln>
+          <a:effectLst/>
+        </p:spPr>
+      </p:cxnSp>
+      <p:sp>
+        <p:nvSpPr>
+          <p:cNvPr id="92" name="Text Box 11"/>
+          <p:cNvSpPr txBox="1">
+            <a:spLocks noChangeArrowheads="1"/>
+          </p:cNvSpPr>
+          <p:nvPr/>
+        </p:nvSpPr>
+        <p:spPr bwMode="auto">
+          <a:xfrm>
+            <a:off x="5614694" y="4767093"/>
+            <a:ext cx="923906" cy="194781"/>
+          </a:xfrm>
+          <a:prstGeom prst="rect">
+            <a:avLst/>
+          </a:prstGeom>
+          <a:solidFill>
+            <a:srgbClr val="FFFFFF"/>
+          </a:solidFill>
+          <a:ln>
+            <a:noFill/>
+          </a:ln>
+          <a:effectLst/>
+          <a:extLst>
+            <a:ext uri="{91240B29-F687-4f45-9708-019B960494DF}">
+              <a14:hiddenLine xmlns="" xmlns:a14="http://schemas.microsoft.com/office/drawing/2010/main" w="9525">
+                <a:solidFill>
+                  <a:srgbClr val="000000"/>
+                </a:solidFill>
+                <a:round/>
+                <a:headEnd/>
+                <a:tailEnd/>
+              </a14:hiddenLine>
+            </a:ext>
+            <a:ext uri="{AF507438-7753-43e0-B8FC-AC1667EBCBE1}">
+              <a14:hiddenEffects xmlns="" xmlns:a14="http://schemas.microsoft.com/office/drawing/2010/main">
+                <a:effectLst>
+                  <a:outerShdw blurRad="63500" dist="38099" dir="2700000" algn="ctr" rotWithShape="0">
+                    <a:srgbClr val="000000">
+                      <a:alpha val="74998"/>
+                    </a:srgbClr>
+                  </a:outerShdw>
+                </a:effectLst>
+              </a14:hiddenEffects>
+            </a:ext>
+          </a:extLst>
+        </p:spPr>
+        <p:txBody>
+          <a:bodyPr lIns="18000" tIns="10800" rIns="18000" bIns="10800" anchor="ctr" anchorCtr="1"/>
+          <a:lstStyle>
+            <a:lvl1pPr>
+              <a:tabLst>
+                <a:tab pos="0" algn="l"/>
+                <a:tab pos="914400" algn="l"/>
+                <a:tab pos="1828800" algn="l"/>
+                <a:tab pos="2743200" algn="l"/>
+                <a:tab pos="3657600" algn="l"/>
+                <a:tab pos="4572000" algn="l"/>
+                <a:tab pos="5486400" algn="l"/>
+                <a:tab pos="6400800" algn="l"/>
+                <a:tab pos="7315200" algn="l"/>
+                <a:tab pos="8229600" algn="l"/>
+                <a:tab pos="9144000" algn="l"/>
+                <a:tab pos="10058400" algn="l"/>
+              </a:tabLst>
+              <a:defRPr>
+                <a:solidFill>
+                  <a:srgbClr val="000000"/>
+                </a:solidFill>
+                <a:latin typeface="Arial" charset="0"/>
+                <a:ea typeface="ＭＳ Ｐゴシック" charset="0"/>
+                <a:cs typeface="Arial" charset="0"/>
+              </a:defRPr>
+            </a:lvl1pPr>
+            <a:lvl2pPr>
+              <a:tabLst>
+                <a:tab pos="0" algn="l"/>
+                <a:tab pos="914400" algn="l"/>
+                <a:tab pos="1828800" algn="l"/>
+                <a:tab pos="2743200" algn="l"/>
+                <a:tab pos="3657600" algn="l"/>
+                <a:tab pos="4572000" algn="l"/>
+                <a:tab pos="5486400" algn="l"/>
+                <a:tab pos="6400800" algn="l"/>
+                <a:tab pos="7315200" algn="l"/>
+                <a:tab pos="8229600" algn="l"/>
+                <a:tab pos="9144000" algn="l"/>
+                <a:tab pos="10058400" algn="l"/>
+              </a:tabLst>
+              <a:defRPr>
+                <a:solidFill>
+                  <a:srgbClr val="000000"/>
+                </a:solidFill>
+                <a:latin typeface="Arial" charset="0"/>
+                <a:ea typeface="Arial" charset="0"/>
+                <a:cs typeface="Arial" charset="0"/>
+              </a:defRPr>
+            </a:lvl2pPr>
+            <a:lvl3pPr>
+              <a:tabLst>
+                <a:tab pos="0" algn="l"/>
+                <a:tab pos="914400" algn="l"/>
+                <a:tab pos="1828800" algn="l"/>
+                <a:tab pos="2743200" algn="l"/>
+                <a:tab pos="3657600" algn="l"/>
+                <a:tab pos="4572000" algn="l"/>
+                <a:tab pos="5486400" algn="l"/>
+                <a:tab pos="6400800" algn="l"/>
+                <a:tab pos="7315200" algn="l"/>
+                <a:tab pos="8229600" algn="l"/>
+                <a:tab pos="9144000" algn="l"/>
+                <a:tab pos="10058400" algn="l"/>
+              </a:tabLst>
+              <a:defRPr>
+                <a:solidFill>
+                  <a:srgbClr val="000000"/>
+                </a:solidFill>
+                <a:latin typeface="Arial" charset="0"/>
+                <a:ea typeface="Arial" charset="0"/>
+                <a:cs typeface="Arial" charset="0"/>
+              </a:defRPr>
+            </a:lvl3pPr>
+            <a:lvl4pPr>
+              <a:tabLst>
+                <a:tab pos="0" algn="l"/>
+                <a:tab pos="914400" algn="l"/>
+                <a:tab pos="1828800" algn="l"/>
+                <a:tab pos="2743200" algn="l"/>
+                <a:tab pos="3657600" algn="l"/>
+                <a:tab pos="4572000" algn="l"/>
+                <a:tab pos="5486400" algn="l"/>
+                <a:tab pos="6400800" algn="l"/>
+                <a:tab pos="7315200" algn="l"/>
+                <a:tab pos="8229600" algn="l"/>
+                <a:tab pos="9144000" algn="l"/>
+                <a:tab pos="10058400" algn="l"/>
+              </a:tabLst>
+              <a:defRPr>
+                <a:solidFill>
+                  <a:srgbClr val="000000"/>
+                </a:solidFill>
+                <a:latin typeface="Arial" charset="0"/>
+                <a:ea typeface="Arial" charset="0"/>
+                <a:cs typeface="Arial" charset="0"/>
+              </a:defRPr>
+            </a:lvl4pPr>
+            <a:lvl5pPr>
+              <a:tabLst>
+                <a:tab pos="0" algn="l"/>
+                <a:tab pos="914400" algn="l"/>
+                <a:tab pos="1828800" algn="l"/>
+                <a:tab pos="2743200" algn="l"/>
+                <a:tab pos="3657600" algn="l"/>
+                <a:tab pos="4572000" algn="l"/>
+                <a:tab pos="5486400" algn="l"/>
+                <a:tab pos="6400800" algn="l"/>
+                <a:tab pos="7315200" algn="l"/>
+                <a:tab pos="8229600" algn="l"/>
+                <a:tab pos="9144000" algn="l"/>
+                <a:tab pos="10058400" algn="l"/>
+              </a:tabLst>
+              <a:defRPr>
+                <a:solidFill>
+                  <a:srgbClr val="000000"/>
+                </a:solidFill>
+                <a:latin typeface="Arial" charset="0"/>
+                <a:ea typeface="Arial" charset="0"/>
+                <a:cs typeface="Arial" charset="0"/>
+              </a:defRPr>
+            </a:lvl5pPr>
+            <a:lvl6pPr marL="2514600" indent="-228600" defTabSz="449263" fontAlgn="base">
+              <a:spcBef>
+                <a:spcPct val="0"/>
+              </a:spcBef>
+              <a:spcAft>
+                <a:spcPct val="0"/>
+              </a:spcAft>
+              <a:buClr>
+                <a:srgbClr val="000000"/>
+              </a:buClr>
+              <a:buSzPct val="100000"/>
+              <a:buFont typeface="Times New Roman" charset="0"/>
+              <a:tabLst>
+                <a:tab pos="0" algn="l"/>
+                <a:tab pos="914400" algn="l"/>
+                <a:tab pos="1828800" algn="l"/>
+                <a:tab pos="2743200" algn="l"/>
+                <a:tab pos="3657600" algn="l"/>
+                <a:tab pos="4572000" algn="l"/>
+                <a:tab pos="5486400" algn="l"/>
+                <a:tab pos="6400800" algn="l"/>
+                <a:tab pos="7315200" algn="l"/>
+                <a:tab pos="8229600" algn="l"/>
+                <a:tab pos="9144000" algn="l"/>
+                <a:tab pos="10058400" algn="l"/>
+              </a:tabLst>
+              <a:defRPr>
+                <a:solidFill>
+                  <a:srgbClr val="000000"/>
+                </a:solidFill>
+                <a:latin typeface="Arial" charset="0"/>
+                <a:ea typeface="Arial" charset="0"/>
+                <a:cs typeface="Arial" charset="0"/>
+              </a:defRPr>
+            </a:lvl6pPr>
+            <a:lvl7pPr marL="2971800" indent="-228600" defTabSz="449263" fontAlgn="base">
+              <a:spcBef>
+                <a:spcPct val="0"/>
+              </a:spcBef>
+              <a:spcAft>
+                <a:spcPct val="0"/>
+              </a:spcAft>
+              <a:buClr>
+                <a:srgbClr val="000000"/>
+              </a:buClr>
+              <a:buSzPct val="100000"/>
+              <a:buFont typeface="Times New Roman" charset="0"/>
+              <a:tabLst>
+                <a:tab pos="0" algn="l"/>
+                <a:tab pos="914400" algn="l"/>
+                <a:tab pos="1828800" algn="l"/>
+                <a:tab pos="2743200" algn="l"/>
+                <a:tab pos="3657600" algn="l"/>
+                <a:tab pos="4572000" algn="l"/>
+                <a:tab pos="5486400" algn="l"/>
+                <a:tab pos="6400800" algn="l"/>
+                <a:tab pos="7315200" algn="l"/>
+                <a:tab pos="8229600" algn="l"/>
+                <a:tab pos="9144000" algn="l"/>
+                <a:tab pos="10058400" algn="l"/>
+              </a:tabLst>
+              <a:defRPr>
+                <a:solidFill>
+                  <a:srgbClr val="000000"/>
+                </a:solidFill>
+                <a:latin typeface="Arial" charset="0"/>
+                <a:ea typeface="Arial" charset="0"/>
+                <a:cs typeface="Arial" charset="0"/>
+              </a:defRPr>
+            </a:lvl7pPr>
+            <a:lvl8pPr marL="3429000" indent="-228600" defTabSz="449263" fontAlgn="base">
+              <a:spcBef>
+                <a:spcPct val="0"/>
+              </a:spcBef>
+              <a:spcAft>
+                <a:spcPct val="0"/>
+              </a:spcAft>
+              <a:buClr>
+                <a:srgbClr val="000000"/>
+              </a:buClr>
+              <a:buSzPct val="100000"/>
+              <a:buFont typeface="Times New Roman" charset="0"/>
+              <a:tabLst>
+                <a:tab pos="0" algn="l"/>
+                <a:tab pos="914400" algn="l"/>
+                <a:tab pos="1828800" algn="l"/>
+                <a:tab pos="2743200" algn="l"/>
+                <a:tab pos="3657600" algn="l"/>
+                <a:tab pos="4572000" algn="l"/>
+                <a:tab pos="5486400" algn="l"/>
+                <a:tab pos="6400800" algn="l"/>
+                <a:tab pos="7315200" algn="l"/>
+                <a:tab pos="8229600" algn="l"/>
+                <a:tab pos="9144000" algn="l"/>
+                <a:tab pos="10058400" algn="l"/>
+              </a:tabLst>
+              <a:defRPr>
+                <a:solidFill>
+                  <a:srgbClr val="000000"/>
+                </a:solidFill>
+                <a:latin typeface="Arial" charset="0"/>
+                <a:ea typeface="Arial" charset="0"/>
+                <a:cs typeface="Arial" charset="0"/>
+              </a:defRPr>
+            </a:lvl8pPr>
+            <a:lvl9pPr marL="3886200" indent="-228600" defTabSz="449263" fontAlgn="base">
+              <a:spcBef>
+                <a:spcPct val="0"/>
+              </a:spcBef>
+              <a:spcAft>
+                <a:spcPct val="0"/>
+              </a:spcAft>
+              <a:buClr>
+                <a:srgbClr val="000000"/>
+              </a:buClr>
+              <a:buSzPct val="100000"/>
+              <a:buFont typeface="Times New Roman" charset="0"/>
+              <a:tabLst>
+                <a:tab pos="0" algn="l"/>
+                <a:tab pos="914400" algn="l"/>
+                <a:tab pos="1828800" algn="l"/>
+                <a:tab pos="2743200" algn="l"/>
+                <a:tab pos="3657600" algn="l"/>
+                <a:tab pos="4572000" algn="l"/>
+                <a:tab pos="5486400" algn="l"/>
+                <a:tab pos="6400800" algn="l"/>
+                <a:tab pos="7315200" algn="l"/>
+                <a:tab pos="8229600" algn="l"/>
+                <a:tab pos="9144000" algn="l"/>
+                <a:tab pos="10058400" algn="l"/>
+              </a:tabLst>
+              <a:defRPr>
+                <a:solidFill>
+                  <a:srgbClr val="000000"/>
+                </a:solidFill>
+                <a:latin typeface="Arial" charset="0"/>
+                <a:ea typeface="Arial" charset="0"/>
+                <a:cs typeface="Arial" charset="0"/>
+              </a:defRPr>
+            </a:lvl9pPr>
+          </a:lstStyle>
+          <a:p>
+            <a:pPr algn="ctr">
+              <a:buClrTx/>
+              <a:buFontTx/>
+              <a:buNone/>
+            </a:pPr>
+            <a:r>
+              <a:rPr lang="es-ES" sz="900" dirty="0"/>
+              <a:t>c</a:t>
+            </a:r>
+            <a:r>
+              <a:rPr lang="es-ES" sz="900" dirty="0" smtClean="0"/>
+              <a:t>uyos organismos son</a:t>
+            </a:r>
+            <a:endParaRPr lang="es-ES" sz="900" dirty="0"/>
+          </a:p>
+        </p:txBody>
+      </p:sp>
+      <p:sp>
+        <p:nvSpPr>
+          <p:cNvPr id="93" name="Text Box 11"/>
+          <p:cNvSpPr txBox="1">
+            <a:spLocks noChangeArrowheads="1"/>
+          </p:cNvSpPr>
+          <p:nvPr/>
+        </p:nvSpPr>
+        <p:spPr bwMode="auto">
+          <a:xfrm>
+            <a:off x="8093674" y="3481233"/>
+            <a:ext cx="923906" cy="194781"/>
+          </a:xfrm>
+          <a:prstGeom prst="rect">
+            <a:avLst/>
+          </a:prstGeom>
+          <a:solidFill>
+            <a:srgbClr val="FFFFFF"/>
+          </a:solidFill>
+          <a:ln>
+            <a:noFill/>
+          </a:ln>
+          <a:effectLst/>
+          <a:extLst>
+            <a:ext uri="{91240B29-F687-4f45-9708-019B960494DF}">
+              <a14:hiddenLine xmlns="" xmlns:a14="http://schemas.microsoft.com/office/drawing/2010/main" w="9525">
+                <a:solidFill>
+                  <a:srgbClr val="000000"/>
+                </a:solidFill>
+                <a:round/>
+                <a:headEnd/>
+                <a:tailEnd/>
+              </a14:hiddenLine>
+            </a:ext>
+            <a:ext uri="{AF507438-7753-43e0-B8FC-AC1667EBCBE1}">
+              <a14:hiddenEffects xmlns="" xmlns:a14="http://schemas.microsoft.com/office/drawing/2010/main">
+                <a:effectLst>
+                  <a:outerShdw blurRad="63500" dist="38099" dir="2700000" algn="ctr" rotWithShape="0">
+                    <a:srgbClr val="000000">
+                      <a:alpha val="74998"/>
+                    </a:srgbClr>
+                  </a:outerShdw>
+                </a:effectLst>
+              </a14:hiddenEffects>
+            </a:ext>
+          </a:extLst>
+        </p:spPr>
+        <p:txBody>
+          <a:bodyPr lIns="18000" tIns="10800" rIns="18000" bIns="10800" anchor="ctr" anchorCtr="1"/>
+          <a:lstStyle>
+            <a:lvl1pPr>
+              <a:tabLst>
+                <a:tab pos="0" algn="l"/>
+                <a:tab pos="914400" algn="l"/>
+                <a:tab pos="1828800" algn="l"/>
+                <a:tab pos="2743200" algn="l"/>
+                <a:tab pos="3657600" algn="l"/>
+                <a:tab pos="4572000" algn="l"/>
+                <a:tab pos="5486400" algn="l"/>
+                <a:tab pos="6400800" algn="l"/>
+                <a:tab pos="7315200" algn="l"/>
+                <a:tab pos="8229600" algn="l"/>
+                <a:tab pos="9144000" algn="l"/>
+                <a:tab pos="10058400" algn="l"/>
+              </a:tabLst>
+              <a:defRPr>
+                <a:solidFill>
+                  <a:srgbClr val="000000"/>
+                </a:solidFill>
+                <a:latin typeface="Arial" charset="0"/>
+                <a:ea typeface="ＭＳ Ｐゴシック" charset="0"/>
+                <a:cs typeface="Arial" charset="0"/>
+              </a:defRPr>
+            </a:lvl1pPr>
+            <a:lvl2pPr>
+              <a:tabLst>
+                <a:tab pos="0" algn="l"/>
+                <a:tab pos="914400" algn="l"/>
+                <a:tab pos="1828800" algn="l"/>
+                <a:tab pos="2743200" algn="l"/>
+                <a:tab pos="3657600" algn="l"/>
+                <a:tab pos="4572000" algn="l"/>
+                <a:tab pos="5486400" algn="l"/>
+                <a:tab pos="6400800" algn="l"/>
+                <a:tab pos="7315200" algn="l"/>
+                <a:tab pos="8229600" algn="l"/>
+                <a:tab pos="9144000" algn="l"/>
+                <a:tab pos="10058400" algn="l"/>
+              </a:tabLst>
+              <a:defRPr>
+                <a:solidFill>
+                  <a:srgbClr val="000000"/>
+                </a:solidFill>
+                <a:latin typeface="Arial" charset="0"/>
+                <a:ea typeface="Arial" charset="0"/>
+                <a:cs typeface="Arial" charset="0"/>
+              </a:defRPr>
+            </a:lvl2pPr>
+            <a:lvl3pPr>
+              <a:tabLst>
+                <a:tab pos="0" algn="l"/>
+                <a:tab pos="914400" algn="l"/>
+                <a:tab pos="1828800" algn="l"/>
+                <a:tab pos="2743200" algn="l"/>
+                <a:tab pos="3657600" algn="l"/>
+                <a:tab pos="4572000" algn="l"/>
+                <a:tab pos="5486400" algn="l"/>
+                <a:tab pos="6400800" algn="l"/>
+                <a:tab pos="7315200" algn="l"/>
+                <a:tab pos="8229600" algn="l"/>
+                <a:tab pos="9144000" algn="l"/>
+                <a:tab pos="10058400" algn="l"/>
+              </a:tabLst>
+              <a:defRPr>
+                <a:solidFill>
+                  <a:srgbClr val="000000"/>
+                </a:solidFill>
+                <a:latin typeface="Arial" charset="0"/>
+                <a:ea typeface="Arial" charset="0"/>
+                <a:cs typeface="Arial" charset="0"/>
+              </a:defRPr>
+            </a:lvl3pPr>
+            <a:lvl4pPr>
+              <a:tabLst>
+                <a:tab pos="0" algn="l"/>
+                <a:tab pos="914400" algn="l"/>
+                <a:tab pos="1828800" algn="l"/>
+                <a:tab pos="2743200" algn="l"/>
+                <a:tab pos="3657600" algn="l"/>
+                <a:tab pos="4572000" algn="l"/>
+                <a:tab pos="5486400" algn="l"/>
+                <a:tab pos="6400800" algn="l"/>
+                <a:tab pos="7315200" algn="l"/>
+                <a:tab pos="8229600" algn="l"/>
+                <a:tab pos="9144000" algn="l"/>
+                <a:tab pos="10058400" algn="l"/>
+              </a:tabLst>
+              <a:defRPr>
+                <a:solidFill>
+                  <a:srgbClr val="000000"/>
+                </a:solidFill>
+                <a:latin typeface="Arial" charset="0"/>
+                <a:ea typeface="Arial" charset="0"/>
+                <a:cs typeface="Arial" charset="0"/>
+              </a:defRPr>
+            </a:lvl4pPr>
+            <a:lvl5pPr>
+              <a:tabLst>
+                <a:tab pos="0" algn="l"/>
+                <a:tab pos="914400" algn="l"/>
+                <a:tab pos="1828800" algn="l"/>
+                <a:tab pos="2743200" algn="l"/>
+                <a:tab pos="3657600" algn="l"/>
+                <a:tab pos="4572000" algn="l"/>
+                <a:tab pos="5486400" algn="l"/>
+                <a:tab pos="6400800" algn="l"/>
+                <a:tab pos="7315200" algn="l"/>
+                <a:tab pos="8229600" algn="l"/>
+                <a:tab pos="9144000" algn="l"/>
+                <a:tab pos="10058400" algn="l"/>
+              </a:tabLst>
+              <a:defRPr>
+                <a:solidFill>
+                  <a:srgbClr val="000000"/>
+                </a:solidFill>
+                <a:latin typeface="Arial" charset="0"/>
+                <a:ea typeface="Arial" charset="0"/>
+                <a:cs typeface="Arial" charset="0"/>
+              </a:defRPr>
+            </a:lvl5pPr>
+            <a:lvl6pPr marL="2514600" indent="-228600" defTabSz="449263" fontAlgn="base">
+              <a:spcBef>
+                <a:spcPct val="0"/>
+              </a:spcBef>
+              <a:spcAft>
+                <a:spcPct val="0"/>
+              </a:spcAft>
+              <a:buClr>
+                <a:srgbClr val="000000"/>
+              </a:buClr>
+              <a:buSzPct val="100000"/>
+              <a:buFont typeface="Times New Roman" charset="0"/>
+              <a:tabLst>
+                <a:tab pos="0" algn="l"/>
+                <a:tab pos="914400" algn="l"/>
+                <a:tab pos="1828800" algn="l"/>
+                <a:tab pos="2743200" algn="l"/>
+                <a:tab pos="3657600" algn="l"/>
+                <a:tab pos="4572000" algn="l"/>
+                <a:tab pos="5486400" algn="l"/>
+                <a:tab pos="6400800" algn="l"/>
+                <a:tab pos="7315200" algn="l"/>
+                <a:tab pos="8229600" algn="l"/>
+                <a:tab pos="9144000" algn="l"/>
+                <a:tab pos="10058400" algn="l"/>
+              </a:tabLst>
+              <a:defRPr>
+                <a:solidFill>
+                  <a:srgbClr val="000000"/>
+                </a:solidFill>
+                <a:latin typeface="Arial" charset="0"/>
+                <a:ea typeface="Arial" charset="0"/>
+                <a:cs typeface="Arial" charset="0"/>
+              </a:defRPr>
+            </a:lvl6pPr>
+            <a:lvl7pPr marL="2971800" indent="-228600" defTabSz="449263" fontAlgn="base">
+              <a:spcBef>
+                <a:spcPct val="0"/>
+              </a:spcBef>
+              <a:spcAft>
+                <a:spcPct val="0"/>
+              </a:spcAft>
+              <a:buClr>
+                <a:srgbClr val="000000"/>
+              </a:buClr>
+              <a:buSzPct val="100000"/>
+              <a:buFont typeface="Times New Roman" charset="0"/>
+              <a:tabLst>
+                <a:tab pos="0" algn="l"/>
+                <a:tab pos="914400" algn="l"/>
+                <a:tab pos="1828800" algn="l"/>
+                <a:tab pos="2743200" algn="l"/>
+                <a:tab pos="3657600" algn="l"/>
+                <a:tab pos="4572000" algn="l"/>
+                <a:tab pos="5486400" algn="l"/>
+                <a:tab pos="6400800" algn="l"/>
+                <a:tab pos="7315200" algn="l"/>
+                <a:tab pos="8229600" algn="l"/>
+                <a:tab pos="9144000" algn="l"/>
+                <a:tab pos="10058400" algn="l"/>
+              </a:tabLst>
+              <a:defRPr>
+                <a:solidFill>
+                  <a:srgbClr val="000000"/>
+                </a:solidFill>
+                <a:latin typeface="Arial" charset="0"/>
+                <a:ea typeface="Arial" charset="0"/>
+                <a:cs typeface="Arial" charset="0"/>
+              </a:defRPr>
+            </a:lvl7pPr>
+            <a:lvl8pPr marL="3429000" indent="-228600" defTabSz="449263" fontAlgn="base">
+              <a:spcBef>
+                <a:spcPct val="0"/>
+              </a:spcBef>
+              <a:spcAft>
+                <a:spcPct val="0"/>
+              </a:spcAft>
+              <a:buClr>
+                <a:srgbClr val="000000"/>
+              </a:buClr>
+              <a:buSzPct val="100000"/>
+              <a:buFont typeface="Times New Roman" charset="0"/>
+              <a:tabLst>
+                <a:tab pos="0" algn="l"/>
+                <a:tab pos="914400" algn="l"/>
+                <a:tab pos="1828800" algn="l"/>
+                <a:tab pos="2743200" algn="l"/>
+                <a:tab pos="3657600" algn="l"/>
+                <a:tab pos="4572000" algn="l"/>
+                <a:tab pos="5486400" algn="l"/>
+                <a:tab pos="6400800" algn="l"/>
+                <a:tab pos="7315200" algn="l"/>
+                <a:tab pos="8229600" algn="l"/>
+                <a:tab pos="9144000" algn="l"/>
+                <a:tab pos="10058400" algn="l"/>
+              </a:tabLst>
+              <a:defRPr>
+                <a:solidFill>
+                  <a:srgbClr val="000000"/>
+                </a:solidFill>
+                <a:latin typeface="Arial" charset="0"/>
+                <a:ea typeface="Arial" charset="0"/>
+                <a:cs typeface="Arial" charset="0"/>
+              </a:defRPr>
+            </a:lvl8pPr>
+            <a:lvl9pPr marL="3886200" indent="-228600" defTabSz="449263" fontAlgn="base">
+              <a:spcBef>
+                <a:spcPct val="0"/>
+              </a:spcBef>
+              <a:spcAft>
+                <a:spcPct val="0"/>
+              </a:spcAft>
+              <a:buClr>
+                <a:srgbClr val="000000"/>
+              </a:buClr>
+              <a:buSzPct val="100000"/>
+              <a:buFont typeface="Times New Roman" charset="0"/>
+              <a:tabLst>
+                <a:tab pos="0" algn="l"/>
+                <a:tab pos="914400" algn="l"/>
+                <a:tab pos="1828800" algn="l"/>
+                <a:tab pos="2743200" algn="l"/>
+                <a:tab pos="3657600" algn="l"/>
+                <a:tab pos="4572000" algn="l"/>
+                <a:tab pos="5486400" algn="l"/>
+                <a:tab pos="6400800" algn="l"/>
+                <a:tab pos="7315200" algn="l"/>
+                <a:tab pos="8229600" algn="l"/>
+                <a:tab pos="9144000" algn="l"/>
+                <a:tab pos="10058400" algn="l"/>
+              </a:tabLst>
+              <a:defRPr>
+                <a:solidFill>
+                  <a:srgbClr val="000000"/>
+                </a:solidFill>
+                <a:latin typeface="Arial" charset="0"/>
+                <a:ea typeface="Arial" charset="0"/>
+                <a:cs typeface="Arial" charset="0"/>
+              </a:defRPr>
+            </a:lvl9pPr>
+          </a:lstStyle>
+          <a:p>
+            <a:pPr algn="ctr">
+              <a:buClrTx/>
+              <a:buFontTx/>
+              <a:buNone/>
+            </a:pPr>
+            <a:r>
+              <a:rPr lang="es-ES" sz="900" dirty="0"/>
+              <a:t>c</a:t>
+            </a:r>
+            <a:r>
+              <a:rPr lang="es-ES" sz="900" dirty="0" smtClean="0"/>
+              <a:t>uyos organismos son</a:t>
+            </a:r>
+            <a:endParaRPr lang="es-ES" sz="900" dirty="0"/>
+          </a:p>
+        </p:txBody>
+      </p:sp>
+      <p:sp>
+        <p:nvSpPr>
+          <p:cNvPr id="94" name="Text Box 11"/>
+          <p:cNvSpPr txBox="1">
+            <a:spLocks noChangeArrowheads="1"/>
+          </p:cNvSpPr>
+          <p:nvPr/>
+        </p:nvSpPr>
+        <p:spPr bwMode="auto">
+          <a:xfrm>
+            <a:off x="6956967" y="5600723"/>
+            <a:ext cx="1052512" cy="194781"/>
+          </a:xfrm>
+          <a:prstGeom prst="rect">
+            <a:avLst/>
+          </a:prstGeom>
+          <a:solidFill>
+            <a:srgbClr val="FFFFFF"/>
+          </a:solidFill>
+          <a:ln>
+            <a:noFill/>
+          </a:ln>
+          <a:effectLst/>
+          <a:extLst>
+            <a:ext uri="{91240B29-F687-4f45-9708-019B960494DF}">
+              <a14:hiddenLine xmlns="" xmlns:a14="http://schemas.microsoft.com/office/drawing/2010/main" w="9525">
+                <a:solidFill>
+                  <a:srgbClr val="000000"/>
+                </a:solidFill>
+                <a:round/>
+                <a:headEnd/>
+                <a:tailEnd/>
+              </a14:hiddenLine>
+            </a:ext>
+            <a:ext uri="{AF507438-7753-43e0-B8FC-AC1667EBCBE1}">
+              <a14:hiddenEffects xmlns="" xmlns:a14="http://schemas.microsoft.com/office/drawing/2010/main">
+                <a:effectLst>
+                  <a:outerShdw blurRad="63500" dist="38099" dir="2700000" algn="ctr" rotWithShape="0">
+                    <a:srgbClr val="000000">
+                      <a:alpha val="74998"/>
+                    </a:srgbClr>
+                  </a:outerShdw>
+                </a:effectLst>
+              </a14:hiddenEffects>
+            </a:ext>
+          </a:extLst>
+        </p:spPr>
+        <p:txBody>
+          <a:bodyPr lIns="18000" tIns="10800" rIns="18000" bIns="10800" anchor="ctr" anchorCtr="1"/>
+          <a:lstStyle>
+            <a:lvl1pPr>
+              <a:tabLst>
+                <a:tab pos="0" algn="l"/>
+                <a:tab pos="914400" algn="l"/>
+                <a:tab pos="1828800" algn="l"/>
+                <a:tab pos="2743200" algn="l"/>
+                <a:tab pos="3657600" algn="l"/>
+                <a:tab pos="4572000" algn="l"/>
+                <a:tab pos="5486400" algn="l"/>
+                <a:tab pos="6400800" algn="l"/>
+                <a:tab pos="7315200" algn="l"/>
+                <a:tab pos="8229600" algn="l"/>
+                <a:tab pos="9144000" algn="l"/>
+                <a:tab pos="10058400" algn="l"/>
+              </a:tabLst>
+              <a:defRPr>
+                <a:solidFill>
+                  <a:srgbClr val="000000"/>
+                </a:solidFill>
+                <a:latin typeface="Arial" charset="0"/>
+                <a:ea typeface="ＭＳ Ｐゴシック" charset="0"/>
+                <a:cs typeface="Arial" charset="0"/>
+              </a:defRPr>
+            </a:lvl1pPr>
+            <a:lvl2pPr>
+              <a:tabLst>
+                <a:tab pos="0" algn="l"/>
+                <a:tab pos="914400" algn="l"/>
+                <a:tab pos="1828800" algn="l"/>
+                <a:tab pos="2743200" algn="l"/>
+                <a:tab pos="3657600" algn="l"/>
+                <a:tab pos="4572000" algn="l"/>
+                <a:tab pos="5486400" algn="l"/>
+                <a:tab pos="6400800" algn="l"/>
+                <a:tab pos="7315200" algn="l"/>
+                <a:tab pos="8229600" algn="l"/>
+                <a:tab pos="9144000" algn="l"/>
+                <a:tab pos="10058400" algn="l"/>
+              </a:tabLst>
+              <a:defRPr>
+                <a:solidFill>
+                  <a:srgbClr val="000000"/>
+                </a:solidFill>
+                <a:latin typeface="Arial" charset="0"/>
+                <a:ea typeface="Arial" charset="0"/>
+                <a:cs typeface="Arial" charset="0"/>
+              </a:defRPr>
+            </a:lvl2pPr>
+            <a:lvl3pPr>
+              <a:tabLst>
+                <a:tab pos="0" algn="l"/>
+                <a:tab pos="914400" algn="l"/>
+                <a:tab pos="1828800" algn="l"/>
+                <a:tab pos="2743200" algn="l"/>
+                <a:tab pos="3657600" algn="l"/>
+                <a:tab pos="4572000" algn="l"/>
+                <a:tab pos="5486400" algn="l"/>
+                <a:tab pos="6400800" algn="l"/>
+                <a:tab pos="7315200" algn="l"/>
+                <a:tab pos="8229600" algn="l"/>
+                <a:tab pos="9144000" algn="l"/>
+                <a:tab pos="10058400" algn="l"/>
+              </a:tabLst>
+              <a:defRPr>
+                <a:solidFill>
+                  <a:srgbClr val="000000"/>
+                </a:solidFill>
+                <a:latin typeface="Arial" charset="0"/>
+                <a:ea typeface="Arial" charset="0"/>
+                <a:cs typeface="Arial" charset="0"/>
+              </a:defRPr>
+            </a:lvl3pPr>
+            <a:lvl4pPr>
+              <a:tabLst>
+                <a:tab pos="0" algn="l"/>
+                <a:tab pos="914400" algn="l"/>
+                <a:tab pos="1828800" algn="l"/>
+                <a:tab pos="2743200" algn="l"/>
+                <a:tab pos="3657600" algn="l"/>
+                <a:tab pos="4572000" algn="l"/>
+                <a:tab pos="5486400" algn="l"/>
+                <a:tab pos="6400800" algn="l"/>
+                <a:tab pos="7315200" algn="l"/>
+                <a:tab pos="8229600" algn="l"/>
+                <a:tab pos="9144000" algn="l"/>
+                <a:tab pos="10058400" algn="l"/>
+              </a:tabLst>
+              <a:defRPr>
+                <a:solidFill>
+                  <a:srgbClr val="000000"/>
+                </a:solidFill>
+                <a:latin typeface="Arial" charset="0"/>
+                <a:ea typeface="Arial" charset="0"/>
+                <a:cs typeface="Arial" charset="0"/>
+              </a:defRPr>
+            </a:lvl4pPr>
+            <a:lvl5pPr>
+              <a:tabLst>
+                <a:tab pos="0" algn="l"/>
+                <a:tab pos="914400" algn="l"/>
+                <a:tab pos="1828800" algn="l"/>
+                <a:tab pos="2743200" algn="l"/>
+                <a:tab pos="3657600" algn="l"/>
+                <a:tab pos="4572000" algn="l"/>
+                <a:tab pos="5486400" algn="l"/>
+                <a:tab pos="6400800" algn="l"/>
+                <a:tab pos="7315200" algn="l"/>
+                <a:tab pos="8229600" algn="l"/>
+                <a:tab pos="9144000" algn="l"/>
+                <a:tab pos="10058400" algn="l"/>
+              </a:tabLst>
+              <a:defRPr>
+                <a:solidFill>
+                  <a:srgbClr val="000000"/>
+                </a:solidFill>
+                <a:latin typeface="Arial" charset="0"/>
+                <a:ea typeface="Arial" charset="0"/>
+                <a:cs typeface="Arial" charset="0"/>
+              </a:defRPr>
+            </a:lvl5pPr>
+            <a:lvl6pPr marL="2514600" indent="-228600" defTabSz="449263" fontAlgn="base">
+              <a:spcBef>
+                <a:spcPct val="0"/>
+              </a:spcBef>
+              <a:spcAft>
+                <a:spcPct val="0"/>
+              </a:spcAft>
+              <a:buClr>
+                <a:srgbClr val="000000"/>
+              </a:buClr>
+              <a:buSzPct val="100000"/>
+              <a:buFont typeface="Times New Roman" charset="0"/>
+              <a:tabLst>
+                <a:tab pos="0" algn="l"/>
+                <a:tab pos="914400" algn="l"/>
+                <a:tab pos="1828800" algn="l"/>
+                <a:tab pos="2743200" algn="l"/>
+                <a:tab pos="3657600" algn="l"/>
+                <a:tab pos="4572000" algn="l"/>
+                <a:tab pos="5486400" algn="l"/>
+                <a:tab pos="6400800" algn="l"/>
+                <a:tab pos="7315200" algn="l"/>
+                <a:tab pos="8229600" algn="l"/>
+                <a:tab pos="9144000" algn="l"/>
+                <a:tab pos="10058400" algn="l"/>
+              </a:tabLst>
+              <a:defRPr>
+                <a:solidFill>
+                  <a:srgbClr val="000000"/>
+                </a:solidFill>
+                <a:latin typeface="Arial" charset="0"/>
+                <a:ea typeface="Arial" charset="0"/>
+                <a:cs typeface="Arial" charset="0"/>
+              </a:defRPr>
+            </a:lvl6pPr>
+            <a:lvl7pPr marL="2971800" indent="-228600" defTabSz="449263" fontAlgn="base">
+              <a:spcBef>
+                <a:spcPct val="0"/>
+              </a:spcBef>
+              <a:spcAft>
+                <a:spcPct val="0"/>
+              </a:spcAft>
+              <a:buClr>
+                <a:srgbClr val="000000"/>
+              </a:buClr>
+              <a:buSzPct val="100000"/>
+              <a:buFont typeface="Times New Roman" charset="0"/>
+              <a:tabLst>
+                <a:tab pos="0" algn="l"/>
+                <a:tab pos="914400" algn="l"/>
+                <a:tab pos="1828800" algn="l"/>
+                <a:tab pos="2743200" algn="l"/>
+                <a:tab pos="3657600" algn="l"/>
+                <a:tab pos="4572000" algn="l"/>
+                <a:tab pos="5486400" algn="l"/>
+                <a:tab pos="6400800" algn="l"/>
+                <a:tab pos="7315200" algn="l"/>
+                <a:tab pos="8229600" algn="l"/>
+                <a:tab pos="9144000" algn="l"/>
+                <a:tab pos="10058400" algn="l"/>
+              </a:tabLst>
+              <a:defRPr>
+                <a:solidFill>
+                  <a:srgbClr val="000000"/>
+                </a:solidFill>
+                <a:latin typeface="Arial" charset="0"/>
+                <a:ea typeface="Arial" charset="0"/>
+                <a:cs typeface="Arial" charset="0"/>
+              </a:defRPr>
+            </a:lvl7pPr>
+            <a:lvl8pPr marL="3429000" indent="-228600" defTabSz="449263" fontAlgn="base">
+              <a:spcBef>
+                <a:spcPct val="0"/>
+              </a:spcBef>
+              <a:spcAft>
+                <a:spcPct val="0"/>
+              </a:spcAft>
+              <a:buClr>
+                <a:srgbClr val="000000"/>
+              </a:buClr>
+              <a:buSzPct val="100000"/>
+              <a:buFont typeface="Times New Roman" charset="0"/>
+              <a:tabLst>
+                <a:tab pos="0" algn="l"/>
+                <a:tab pos="914400" algn="l"/>
+                <a:tab pos="1828800" algn="l"/>
+                <a:tab pos="2743200" algn="l"/>
+                <a:tab pos="3657600" algn="l"/>
+                <a:tab pos="4572000" algn="l"/>
+                <a:tab pos="5486400" algn="l"/>
+                <a:tab pos="6400800" algn="l"/>
+                <a:tab pos="7315200" algn="l"/>
+                <a:tab pos="8229600" algn="l"/>
+                <a:tab pos="9144000" algn="l"/>
+                <a:tab pos="10058400" algn="l"/>
+              </a:tabLst>
+              <a:defRPr>
+                <a:solidFill>
+                  <a:srgbClr val="000000"/>
+                </a:solidFill>
+                <a:latin typeface="Arial" charset="0"/>
+                <a:ea typeface="Arial" charset="0"/>
+                <a:cs typeface="Arial" charset="0"/>
+              </a:defRPr>
+            </a:lvl8pPr>
+            <a:lvl9pPr marL="3886200" indent="-228600" defTabSz="449263" fontAlgn="base">
+              <a:spcBef>
+                <a:spcPct val="0"/>
+              </a:spcBef>
+              <a:spcAft>
+                <a:spcPct val="0"/>
+              </a:spcAft>
+              <a:buClr>
+                <a:srgbClr val="000000"/>
+              </a:buClr>
+              <a:buSzPct val="100000"/>
+              <a:buFont typeface="Times New Roman" charset="0"/>
+              <a:tabLst>
+                <a:tab pos="0" algn="l"/>
+                <a:tab pos="914400" algn="l"/>
+                <a:tab pos="1828800" algn="l"/>
+                <a:tab pos="2743200" algn="l"/>
+                <a:tab pos="3657600" algn="l"/>
+                <a:tab pos="4572000" algn="l"/>
+                <a:tab pos="5486400" algn="l"/>
+                <a:tab pos="6400800" algn="l"/>
+                <a:tab pos="7315200" algn="l"/>
+                <a:tab pos="8229600" algn="l"/>
+                <a:tab pos="9144000" algn="l"/>
+                <a:tab pos="10058400" algn="l"/>
+              </a:tabLst>
+              <a:defRPr>
+                <a:solidFill>
+                  <a:srgbClr val="000000"/>
+                </a:solidFill>
+                <a:latin typeface="Arial" charset="0"/>
+                <a:ea typeface="Arial" charset="0"/>
+                <a:cs typeface="Arial" charset="0"/>
+              </a:defRPr>
+            </a:lvl9pPr>
+          </a:lstStyle>
+          <a:p>
+            <a:pPr algn="ctr">
+              <a:buClrTx/>
+              <a:buFontTx/>
+              <a:buNone/>
+            </a:pPr>
+            <a:r>
+              <a:rPr lang="es-ES" sz="900" dirty="0" smtClean="0"/>
+              <a:t>l</a:t>
+            </a:r>
+            <a:r>
+              <a:rPr lang="es-ES" sz="900" dirty="0"/>
+              <a:t>o</a:t>
+            </a:r>
+            <a:r>
+              <a:rPr lang="es-ES" sz="900" dirty="0" smtClean="0"/>
+              <a:t>s cuales son</a:t>
+            </a:r>
+            <a:endParaRPr lang="es-ES" sz="900" dirty="0"/>
+          </a:p>
+        </p:txBody>
+      </p:sp>
     </p:spTree>
     <p:extLst>
       <p:ext uri="{BB962C8B-B14F-4D97-AF65-F5344CB8AC3E}">

</xml_diff>